<commit_message>
Actualización de la presentación final
Agregado archivos de la presentación y base de datos actualizada para una mejor presentación.
</commit_message>
<xml_diff>
--- a/Presentación PowerPoint/punta_guia_presentacion.pptx
+++ b/Presentación PowerPoint/punta_guia_presentacion.pptx
@@ -6,12 +6,15 @@
   </p:sldMasterIdLst>
   <p:sldIdLst>
     <p:sldId id="257" r:id="rId2"/>
-    <p:sldId id="258" r:id="rId3"/>
+    <p:sldId id="265" r:id="rId3"/>
     <p:sldId id="259" r:id="rId4"/>
-    <p:sldId id="261" r:id="rId5"/>
-    <p:sldId id="262" r:id="rId6"/>
-    <p:sldId id="263" r:id="rId7"/>
+    <p:sldId id="262" r:id="rId5"/>
+    <p:sldId id="268" r:id="rId6"/>
+    <p:sldId id="269" r:id="rId7"/>
     <p:sldId id="264" r:id="rId8"/>
+    <p:sldId id="263" r:id="rId9"/>
+    <p:sldId id="267" r:id="rId10"/>
+    <p:sldId id="266" r:id="rId11"/>
   </p:sldIdLst>
   <p:sldSz cx="12192000" cy="6858000"/>
   <p:notesSz cx="6858000" cy="9144000"/>
@@ -864,7 +867,7 @@
             <a:fld id="{B61BEF0D-F0BB-DE4B-95CE-6DB70DBA9567}" type="datetimeFigureOut">
               <a:rPr lang="en-US" dirty="0"/>
               <a:pPr/>
-              <a:t>3/25/2019</a:t>
+              <a:t>4/24/2019</a:t>
             </a:fld>
             <a:endParaRPr lang="en-US" dirty="0"/>
           </a:p>
@@ -1112,7 +1115,7 @@
             <a:fld id="{B61BEF0D-F0BB-DE4B-95CE-6DB70DBA9567}" type="datetimeFigureOut">
               <a:rPr lang="en-US" dirty="0"/>
               <a:pPr/>
-              <a:t>3/25/2019</a:t>
+              <a:t>4/24/2019</a:t>
             </a:fld>
             <a:endParaRPr lang="en-US" dirty="0"/>
           </a:p>
@@ -1423,7 +1426,7 @@
             <a:fld id="{B61BEF0D-F0BB-DE4B-95CE-6DB70DBA9567}" type="datetimeFigureOut">
               <a:rPr lang="en-US" dirty="0"/>
               <a:pPr/>
-              <a:t>3/25/2019</a:t>
+              <a:t>4/24/2019</a:t>
             </a:fld>
             <a:endParaRPr lang="en-US" dirty="0"/>
           </a:p>
@@ -1753,7 +1756,7 @@
             <a:fld id="{B61BEF0D-F0BB-DE4B-95CE-6DB70DBA9567}" type="datetimeFigureOut">
               <a:rPr lang="en-US" dirty="0"/>
               <a:pPr/>
-              <a:t>3/25/2019</a:t>
+              <a:t>4/24/2019</a:t>
             </a:fld>
             <a:endParaRPr lang="en-US" dirty="0"/>
           </a:p>
@@ -2064,7 +2067,7 @@
             <a:fld id="{B61BEF0D-F0BB-DE4B-95CE-6DB70DBA9567}" type="datetimeFigureOut">
               <a:rPr lang="en-US" dirty="0"/>
               <a:pPr/>
-              <a:t>3/25/2019</a:t>
+              <a:t>4/24/2019</a:t>
             </a:fld>
             <a:endParaRPr lang="en-US" dirty="0"/>
           </a:p>
@@ -2454,7 +2457,7 @@
             <a:fld id="{B61BEF0D-F0BB-DE4B-95CE-6DB70DBA9567}" type="datetimeFigureOut">
               <a:rPr lang="en-US" dirty="0"/>
               <a:pPr/>
-              <a:t>3/25/2019</a:t>
+              <a:t>4/24/2019</a:t>
             </a:fld>
             <a:endParaRPr lang="en-US" dirty="0"/>
           </a:p>
@@ -2620,7 +2623,7 @@
           <a:p>
             <a:fld id="{55C6B4A9-1611-4792-9094-5F34BCA07E0B}" type="datetimeFigureOut">
               <a:rPr lang="en-US" dirty="0"/>
-              <a:t>3/25/2019</a:t>
+              <a:t>4/24/2019</a:t>
             </a:fld>
             <a:endParaRPr lang="en-US" dirty="0"/>
           </a:p>
@@ -2796,7 +2799,7 @@
             <a:fld id="{B61BEF0D-F0BB-DE4B-95CE-6DB70DBA9567}" type="datetimeFigureOut">
               <a:rPr lang="en-US" dirty="0"/>
               <a:pPr/>
-              <a:t>3/25/2019</a:t>
+              <a:t>4/24/2019</a:t>
             </a:fld>
             <a:endParaRPr lang="en-US" dirty="0"/>
           </a:p>
@@ -2962,7 +2965,7 @@
           <a:p>
             <a:fld id="{42A54C80-263E-416B-A8E0-580EDEADCBDC}" type="datetimeFigureOut">
               <a:rPr lang="en-US" dirty="0"/>
-              <a:t>3/25/2019</a:t>
+              <a:t>4/24/2019</a:t>
             </a:fld>
             <a:endParaRPr lang="en-US" dirty="0"/>
           </a:p>
@@ -3205,7 +3208,7 @@
             <a:fld id="{B61BEF0D-F0BB-DE4B-95CE-6DB70DBA9567}" type="datetimeFigureOut">
               <a:rPr lang="en-US" dirty="0"/>
               <a:pPr/>
-              <a:t>3/25/2019</a:t>
+              <a:t>4/24/2019</a:t>
             </a:fld>
             <a:endParaRPr lang="en-US" dirty="0"/>
           </a:p>
@@ -3433,7 +3436,7 @@
           <a:p>
             <a:fld id="{42A54C80-263E-416B-A8E0-580EDEADCBDC}" type="datetimeFigureOut">
               <a:rPr lang="en-US" dirty="0"/>
-              <a:t>3/25/2019</a:t>
+              <a:t>4/24/2019</a:t>
             </a:fld>
             <a:endParaRPr lang="en-US" dirty="0"/>
           </a:p>
@@ -3803,7 +3806,7 @@
             <a:fld id="{B61BEF0D-F0BB-DE4B-95CE-6DB70DBA9567}" type="datetimeFigureOut">
               <a:rPr lang="en-US" dirty="0"/>
               <a:pPr/>
-              <a:t>3/25/2019</a:t>
+              <a:t>4/24/2019</a:t>
             </a:fld>
             <a:endParaRPr lang="en-US" dirty="0"/>
           </a:p>
@@ -3923,7 +3926,7 @@
             <a:fld id="{B61BEF0D-F0BB-DE4B-95CE-6DB70DBA9567}" type="datetimeFigureOut">
               <a:rPr lang="en-US" dirty="0"/>
               <a:pPr/>
-              <a:t>3/25/2019</a:t>
+              <a:t>4/24/2019</a:t>
             </a:fld>
             <a:endParaRPr lang="en-US" dirty="0"/>
           </a:p>
@@ -4015,7 +4018,7 @@
             <a:fld id="{B61BEF0D-F0BB-DE4B-95CE-6DB70DBA9567}" type="datetimeFigureOut">
               <a:rPr lang="en-US" dirty="0"/>
               <a:pPr/>
-              <a:t>3/25/2019</a:t>
+              <a:t>4/24/2019</a:t>
             </a:fld>
             <a:endParaRPr lang="en-US" dirty="0"/>
           </a:p>
@@ -4266,7 +4269,7 @@
           <a:p>
             <a:fld id="{42A54C80-263E-416B-A8E0-580EDEADCBDC}" type="datetimeFigureOut">
               <a:rPr lang="en-US" dirty="0"/>
-              <a:t>3/25/2019</a:t>
+              <a:t>4/24/2019</a:t>
             </a:fld>
             <a:endParaRPr lang="en-US" dirty="0"/>
           </a:p>
@@ -4568,7 +4571,7 @@
             <a:fld id="{B61BEF0D-F0BB-DE4B-95CE-6DB70DBA9567}" type="datetimeFigureOut">
               <a:rPr lang="en-US" dirty="0"/>
               <a:pPr/>
-              <a:t>3/25/2019</a:t>
+              <a:t>4/24/2019</a:t>
             </a:fld>
             <a:endParaRPr lang="en-US" dirty="0"/>
           </a:p>
@@ -5269,7 +5272,7 @@
             <a:fld id="{B61BEF0D-F0BB-DE4B-95CE-6DB70DBA9567}" type="datetimeFigureOut">
               <a:rPr lang="en-US" dirty="0"/>
               <a:pPr/>
-              <a:t>3/25/2019</a:t>
+              <a:t>4/24/2019</a:t>
             </a:fld>
             <a:endParaRPr lang="en-US" dirty="0"/>
           </a:p>
@@ -5828,7 +5831,52 @@
             <p:ph type="title"/>
           </p:nvPr>
         </p:nvSpPr>
-        <p:spPr/>
+        <p:spPr>
+          <a:xfrm>
+            <a:off x="1723790" y="2015565"/>
+            <a:ext cx="8596668" cy="1826581"/>
+          </a:xfrm>
+          <a:gradFill flip="none" rotWithShape="1">
+            <a:gsLst>
+              <a:gs pos="0">
+                <a:schemeClr val="accent2">
+                  <a:lumMod val="67000"/>
+                </a:schemeClr>
+              </a:gs>
+              <a:gs pos="48000">
+                <a:schemeClr val="accent2">
+                  <a:lumMod val="97000"/>
+                  <a:lumOff val="3000"/>
+                </a:schemeClr>
+              </a:gs>
+              <a:gs pos="100000">
+                <a:schemeClr val="accent2">
+                  <a:lumMod val="60000"/>
+                  <a:lumOff val="40000"/>
+                </a:schemeClr>
+              </a:gs>
+            </a:gsLst>
+            <a:lin ang="16200000" scaled="1"/>
+            <a:tileRect/>
+          </a:gradFill>
+          <a:ln>
+            <a:noFill/>
+          </a:ln>
+        </p:spPr>
+        <p:style>
+          <a:lnRef idx="0">
+            <a:scrgbClr r="0" g="0" b="0"/>
+          </a:lnRef>
+          <a:fillRef idx="0">
+            <a:scrgbClr r="0" g="0" b="0"/>
+          </a:fillRef>
+          <a:effectRef idx="0">
+            <a:scrgbClr r="0" g="0" b="0"/>
+          </a:effectRef>
+          <a:fontRef idx="minor">
+            <a:schemeClr val="lt1"/>
+          </a:fontRef>
+        </p:style>
         <p:txBody>
           <a:bodyPr>
             <a:normAutofit/>
@@ -5858,7 +5906,7 @@
                   </a:schemeClr>
                 </a:solidFill>
               </a:rPr>
-              <a:t>PUNTA GUÍA</a:t>
+              <a:t>PUNTAGUÍA</a:t>
             </a:r>
             <a:endParaRPr lang="es-ES" sz="8800" b="1" dirty="0">
               <a:ln w="22225">
@@ -5967,10 +6015,283 @@
           </a:prstGeom>
         </p:spPr>
       </p:pic>
+      <p:sp>
+        <p:nvSpPr>
+          <p:cNvPr id="3" name="CuadroTexto 2"/>
+          <p:cNvSpPr txBox="1"/>
+          <p:nvPr/>
+        </p:nvSpPr>
+        <p:spPr>
+          <a:xfrm>
+            <a:off x="1723790" y="4091403"/>
+            <a:ext cx="8596668" cy="523220"/>
+          </a:xfrm>
+          <a:prstGeom prst="rect">
+            <a:avLst/>
+          </a:prstGeom>
+          <a:noFill/>
+        </p:spPr>
+        <p:txBody>
+          <a:bodyPr wrap="square" rtlCol="0">
+            <a:spAutoFit/>
+          </a:bodyPr>
+          <a:lstStyle/>
+          <a:p>
+            <a:pPr algn="ctr"/>
+            <a:r>
+              <a:rPr lang="es-ES" sz="2800" i="1" dirty="0" smtClean="0">
+                <a:solidFill>
+                  <a:schemeClr val="accent2">
+                    <a:lumMod val="50000"/>
+                  </a:schemeClr>
+                </a:solidFill>
+              </a:rPr>
+              <a:t>Sistema de Guía Turística</a:t>
+            </a:r>
+            <a:endParaRPr lang="es-ES" sz="2800" i="1" dirty="0">
+              <a:solidFill>
+                <a:schemeClr val="accent2">
+                  <a:lumMod val="50000"/>
+                </a:schemeClr>
+              </a:solidFill>
+            </a:endParaRPr>
+          </a:p>
+        </p:txBody>
+      </p:sp>
+      <p:pic>
+        <p:nvPicPr>
+          <p:cNvPr id="4" name="Imagen 3"/>
+          <p:cNvPicPr>
+            <a:picLocks noChangeAspect="1"/>
+          </p:cNvPicPr>
+          <p:nvPr/>
+        </p:nvPicPr>
+        <p:blipFill>
+          <a:blip r:embed="rId6">
+            <a:extLst>
+              <a:ext uri="{28A0092B-C50C-407E-A947-70E740481C1C}">
+                <a14:useLocalDpi xmlns:a14="http://schemas.microsoft.com/office/drawing/2010/main" val="0"/>
+              </a:ext>
+            </a:extLst>
+          </a:blip>
+          <a:stretch>
+            <a:fillRect/>
+          </a:stretch>
+        </p:blipFill>
+        <p:spPr>
+          <a:xfrm>
+            <a:off x="4270633" y="3972669"/>
+            <a:ext cx="3338304" cy="2885331"/>
+          </a:xfrm>
+          <a:prstGeom prst="rect">
+            <a:avLst/>
+          </a:prstGeom>
+        </p:spPr>
+      </p:pic>
     </p:spTree>
     <p:extLst>
       <p:ext uri="{BB962C8B-B14F-4D97-AF65-F5344CB8AC3E}">
         <p14:creationId xmlns:p14="http://schemas.microsoft.com/office/powerpoint/2010/main" val="1755147719"/>
+      </p:ext>
+    </p:extLst>
+  </p:cSld>
+  <p:clrMapOvr>
+    <a:masterClrMapping/>
+  </p:clrMapOvr>
+  <p:timing>
+    <p:tnLst>
+      <p:par>
+        <p:cTn id="1" dur="indefinite" restart="never" nodeType="tmRoot"/>
+      </p:par>
+    </p:tnLst>
+  </p:timing>
+</p:sld>
+</file>
+
+<file path=ppt/slides/slide10.xml><?xml version="1.0" encoding="utf-8"?>
+<p:sld xmlns:a="http://schemas.openxmlformats.org/drawingml/2006/main" xmlns:r="http://schemas.openxmlformats.org/officeDocument/2006/relationships" xmlns:p="http://schemas.openxmlformats.org/presentationml/2006/main" showMasterSp="0">
+  <p:cSld>
+    <p:spTree>
+      <p:nvGrpSpPr>
+        <p:cNvPr id="1" name=""/>
+        <p:cNvGrpSpPr/>
+        <p:nvPr/>
+      </p:nvGrpSpPr>
+      <p:grpSpPr>
+        <a:xfrm>
+          <a:off x="0" y="0"/>
+          <a:ext cx="0" cy="0"/>
+          <a:chOff x="0" y="0"/>
+          <a:chExt cx="0" cy="0"/>
+        </a:xfrm>
+      </p:grpSpPr>
+      <p:pic>
+        <p:nvPicPr>
+          <p:cNvPr id="12" name="Imagen 11"/>
+          <p:cNvPicPr>
+            <a:picLocks noChangeAspect="1"/>
+          </p:cNvPicPr>
+          <p:nvPr/>
+        </p:nvPicPr>
+        <p:blipFill rotWithShape="1">
+          <a:blip r:embed="rId2">
+            <a:extLst>
+              <a:ext uri="{28A0092B-C50C-407E-A947-70E740481C1C}">
+                <a14:useLocalDpi xmlns:a14="http://schemas.microsoft.com/office/drawing/2010/main" val="0"/>
+              </a:ext>
+            </a:extLst>
+          </a:blip>
+          <a:srcRect l="14032" r="10038" b="10863"/>
+          <a:stretch/>
+        </p:blipFill>
+        <p:spPr>
+          <a:xfrm rot="16200000">
+            <a:off x="8471529" y="3004960"/>
+            <a:ext cx="6725431" cy="715511"/>
+          </a:xfrm>
+          <a:prstGeom prst="rect">
+            <a:avLst/>
+          </a:prstGeom>
+        </p:spPr>
+      </p:pic>
+      <p:pic>
+        <p:nvPicPr>
+          <p:cNvPr id="5" name="Imagen 4"/>
+          <p:cNvPicPr>
+            <a:picLocks noChangeAspect="1"/>
+          </p:cNvPicPr>
+          <p:nvPr/>
+        </p:nvPicPr>
+        <p:blipFill>
+          <a:blip r:embed="rId3">
+            <a:extLst>
+              <a:ext uri="{28A0092B-C50C-407E-A947-70E740481C1C}">
+                <a14:useLocalDpi xmlns:a14="http://schemas.microsoft.com/office/drawing/2010/main" val="0"/>
+              </a:ext>
+            </a:extLst>
+          </a:blip>
+          <a:stretch>
+            <a:fillRect/>
+          </a:stretch>
+        </p:blipFill>
+        <p:spPr>
+          <a:xfrm>
+            <a:off x="10320458" y="382391"/>
+            <a:ext cx="1578644" cy="576471"/>
+          </a:xfrm>
+          <a:prstGeom prst="rect">
+            <a:avLst/>
+          </a:prstGeom>
+        </p:spPr>
+      </p:pic>
+      <p:pic>
+        <p:nvPicPr>
+          <p:cNvPr id="6" name="Imagen 5"/>
+          <p:cNvPicPr>
+            <a:picLocks noChangeAspect="1"/>
+          </p:cNvPicPr>
+          <p:nvPr/>
+        </p:nvPicPr>
+        <p:blipFill>
+          <a:blip r:embed="rId4">
+            <a:extLst>
+              <a:ext uri="{28A0092B-C50C-407E-A947-70E740481C1C}">
+                <a14:useLocalDpi xmlns:a14="http://schemas.microsoft.com/office/drawing/2010/main" val="0"/>
+              </a:ext>
+            </a:extLst>
+          </a:blip>
+          <a:stretch>
+            <a:fillRect/>
+          </a:stretch>
+        </p:blipFill>
+        <p:spPr>
+          <a:xfrm>
+            <a:off x="8833174" y="457633"/>
+            <a:ext cx="1288132" cy="504389"/>
+          </a:xfrm>
+          <a:prstGeom prst="rect">
+            <a:avLst/>
+          </a:prstGeom>
+        </p:spPr>
+      </p:pic>
+      <p:pic>
+        <p:nvPicPr>
+          <p:cNvPr id="11" name="Imagen 10"/>
+          <p:cNvPicPr>
+            <a:picLocks noChangeAspect="1"/>
+          </p:cNvPicPr>
+          <p:nvPr/>
+        </p:nvPicPr>
+        <p:blipFill>
+          <a:blip r:embed="rId5">
+            <a:extLst>
+              <a:ext uri="{28A0092B-C50C-407E-A947-70E740481C1C}">
+                <a14:useLocalDpi xmlns:a14="http://schemas.microsoft.com/office/drawing/2010/main" val="0"/>
+              </a:ext>
+            </a:extLst>
+          </a:blip>
+          <a:stretch>
+            <a:fillRect/>
+          </a:stretch>
+        </p:blipFill>
+        <p:spPr>
+          <a:xfrm>
+            <a:off x="165035" y="78488"/>
+            <a:ext cx="8211196" cy="1189873"/>
+          </a:xfrm>
+          <a:prstGeom prst="rect">
+            <a:avLst/>
+          </a:prstGeom>
+        </p:spPr>
+      </p:pic>
+      <p:sp>
+        <p:nvSpPr>
+          <p:cNvPr id="2" name="CuadroTexto 1"/>
+          <p:cNvSpPr txBox="1"/>
+          <p:nvPr/>
+        </p:nvSpPr>
+        <p:spPr>
+          <a:xfrm>
+            <a:off x="3483864" y="2947216"/>
+            <a:ext cx="4733988" cy="830997"/>
+          </a:xfrm>
+          <a:prstGeom prst="rect">
+            <a:avLst/>
+          </a:prstGeom>
+          <a:noFill/>
+        </p:spPr>
+        <p:txBody>
+          <a:bodyPr wrap="none" rtlCol="0">
+            <a:spAutoFit/>
+          </a:bodyPr>
+          <a:lstStyle/>
+          <a:p>
+            <a:r>
+              <a:rPr lang="es-ES" sz="4800" dirty="0" smtClean="0">
+                <a:solidFill>
+                  <a:schemeClr val="tx1">
+                    <a:lumMod val="85000"/>
+                    <a:lumOff val="15000"/>
+                  </a:schemeClr>
+                </a:solidFill>
+              </a:rPr>
+              <a:t>¡Muchas gracias!</a:t>
+            </a:r>
+            <a:endParaRPr lang="es-ES" sz="4800" dirty="0">
+              <a:solidFill>
+                <a:schemeClr val="tx1">
+                  <a:lumMod val="85000"/>
+                  <a:lumOff val="15000"/>
+                </a:schemeClr>
+              </a:solidFill>
+            </a:endParaRPr>
+          </a:p>
+        </p:txBody>
+      </p:sp>
+    </p:spTree>
+    <p:extLst>
+      <p:ext uri="{BB962C8B-B14F-4D97-AF65-F5344CB8AC3E}">
+        <p14:creationId xmlns:p14="http://schemas.microsoft.com/office/powerpoint/2010/main" val="122192243"/>
       </p:ext>
     </p:extLst>
   </p:cSld>
@@ -6033,86 +6354,6 @@
           </a:prstGeom>
         </p:spPr>
       </p:pic>
-      <p:sp>
-        <p:nvSpPr>
-          <p:cNvPr id="8" name="Marcador de texto 7"/>
-          <p:cNvSpPr>
-            <a:spLocks noGrp="1"/>
-          </p:cNvSpPr>
-          <p:nvPr>
-            <p:ph type="body" idx="1"/>
-          </p:nvPr>
-        </p:nvSpPr>
-        <p:spPr>
-          <a:xfrm>
-            <a:off x="1723790" y="5121024"/>
-            <a:ext cx="8596668" cy="860400"/>
-          </a:xfrm>
-        </p:spPr>
-        <p:txBody>
-          <a:bodyPr/>
-          <a:lstStyle/>
-          <a:p>
-            <a:r>
-              <a:rPr lang="es-ES" dirty="0" smtClean="0">
-                <a:solidFill>
-                  <a:schemeClr val="accent2">
-                    <a:lumMod val="50000"/>
-                  </a:schemeClr>
-                </a:solidFill>
-              </a:rPr>
-              <a:t>Lucas</a:t>
-            </a:r>
-            <a:r>
-              <a:rPr lang="es-ES" dirty="0" smtClean="0">
-                <a:solidFill>
-                  <a:schemeClr val="accent2">
-                    <a:lumMod val="50000"/>
-                  </a:schemeClr>
-                </a:solidFill>
-              </a:rPr>
-              <a:t> </a:t>
-            </a:r>
-            <a:r>
-              <a:rPr lang="es-ES" dirty="0" smtClean="0">
-                <a:solidFill>
-                  <a:schemeClr val="accent2">
-                    <a:lumMod val="50000"/>
-                  </a:schemeClr>
-                </a:solidFill>
-              </a:rPr>
-              <a:t>Olivera, Noelia Nieves, Juan Pablo Rolando, </a:t>
-            </a:r>
-            <a:r>
-              <a:rPr lang="es-ES" dirty="0" err="1" smtClean="0">
-                <a:solidFill>
-                  <a:schemeClr val="accent2">
-                    <a:lumMod val="50000"/>
-                  </a:schemeClr>
-                </a:solidFill>
-              </a:rPr>
-              <a:t>Angeles</a:t>
-            </a:r>
-            <a:r>
-              <a:rPr lang="es-ES" dirty="0" smtClean="0">
-                <a:solidFill>
-                  <a:schemeClr val="accent2">
-                    <a:lumMod val="50000"/>
-                  </a:schemeClr>
-                </a:solidFill>
-              </a:rPr>
-              <a:t> Nieves</a:t>
-            </a:r>
-            <a:endParaRPr lang="es-ES" dirty="0">
-              <a:solidFill>
-                <a:schemeClr val="accent2">
-                  <a:lumMod val="50000"/>
-                </a:schemeClr>
-              </a:solidFill>
-            </a:endParaRPr>
-          </a:p>
-        </p:txBody>
-      </p:sp>
       <p:pic>
         <p:nvPicPr>
           <p:cNvPr id="5" name="Imagen 4"/>
@@ -6205,7 +6446,7 @@
       </p:pic>
       <p:pic>
         <p:nvPicPr>
-          <p:cNvPr id="2" name="Imagen 1"/>
+          <p:cNvPr id="3" name="Imagen 2"/>
           <p:cNvPicPr>
             <a:picLocks noChangeAspect="1"/>
           </p:cNvPicPr>
@@ -6225,18 +6466,438 @@
         </p:blipFill>
         <p:spPr>
           <a:xfrm>
-            <a:off x="3493202" y="382391"/>
-            <a:ext cx="5140820" cy="4864930"/>
+            <a:off x="3986576" y="2274203"/>
+            <a:ext cx="1591985" cy="1921027"/>
           </a:xfrm>
           <a:prstGeom prst="rect">
             <a:avLst/>
           </a:prstGeom>
         </p:spPr>
       </p:pic>
+      <p:pic>
+        <p:nvPicPr>
+          <p:cNvPr id="4" name="Imagen 3"/>
+          <p:cNvPicPr>
+            <a:picLocks noChangeAspect="1"/>
+          </p:cNvPicPr>
+          <p:nvPr/>
+        </p:nvPicPr>
+        <p:blipFill>
+          <a:blip r:embed="rId7">
+            <a:extLst>
+              <a:ext uri="{28A0092B-C50C-407E-A947-70E740481C1C}">
+                <a14:useLocalDpi xmlns:a14="http://schemas.microsoft.com/office/drawing/2010/main" val="0"/>
+              </a:ext>
+            </a:extLst>
+          </a:blip>
+          <a:stretch>
+            <a:fillRect/>
+          </a:stretch>
+        </p:blipFill>
+        <p:spPr>
+          <a:xfrm>
+            <a:off x="1456245" y="2274202"/>
+            <a:ext cx="1789613" cy="1921028"/>
+          </a:xfrm>
+          <a:prstGeom prst="rect">
+            <a:avLst/>
+          </a:prstGeom>
+        </p:spPr>
+      </p:pic>
+      <p:sp>
+        <p:nvSpPr>
+          <p:cNvPr id="9" name="CuadroTexto 8"/>
+          <p:cNvSpPr txBox="1"/>
+          <p:nvPr/>
+        </p:nvSpPr>
+        <p:spPr>
+          <a:xfrm>
+            <a:off x="3715578" y="4249780"/>
+            <a:ext cx="2127562" cy="2123658"/>
+          </a:xfrm>
+          <a:prstGeom prst="rect">
+            <a:avLst/>
+          </a:prstGeom>
+          <a:noFill/>
+        </p:spPr>
+        <p:txBody>
+          <a:bodyPr wrap="square" rtlCol="0">
+            <a:spAutoFit/>
+          </a:bodyPr>
+          <a:lstStyle/>
+          <a:p>
+            <a:pPr algn="ctr"/>
+            <a:r>
+              <a:rPr lang="es-ES" sz="2400" b="1" dirty="0">
+                <a:solidFill>
+                  <a:schemeClr val="accent2">
+                    <a:lumMod val="50000"/>
+                  </a:schemeClr>
+                </a:solidFill>
+                <a:latin typeface="Bahnschrift Light" panose="020B0502040204020203" pitchFamily="34" charset="0"/>
+              </a:rPr>
+              <a:t>Noelia Nieves</a:t>
+            </a:r>
+          </a:p>
+          <a:p>
+            <a:pPr algn="ctr"/>
+            <a:r>
+              <a:rPr lang="es-ES" dirty="0">
+                <a:solidFill>
+                  <a:schemeClr val="accent2">
+                    <a:lumMod val="50000"/>
+                  </a:schemeClr>
+                </a:solidFill>
+                <a:latin typeface="Bahnschrift Light" panose="020B0502040204020203" pitchFamily="34" charset="0"/>
+              </a:rPr>
+              <a:t>*Estudiante Asistente Docente de Laboratorio de Tecnologías Digitales.</a:t>
+            </a:r>
+          </a:p>
+          <a:p>
+            <a:endParaRPr lang="es-ES" dirty="0"/>
+          </a:p>
+        </p:txBody>
+      </p:sp>
+      <p:sp>
+        <p:nvSpPr>
+          <p:cNvPr id="10" name="CuadroTexto 9"/>
+          <p:cNvSpPr txBox="1"/>
+          <p:nvPr/>
+        </p:nvSpPr>
+        <p:spPr>
+          <a:xfrm>
+            <a:off x="1225464" y="4218313"/>
+            <a:ext cx="2251174" cy="1569660"/>
+          </a:xfrm>
+          <a:prstGeom prst="rect">
+            <a:avLst/>
+          </a:prstGeom>
+          <a:noFill/>
+        </p:spPr>
+        <p:txBody>
+          <a:bodyPr wrap="square" rtlCol="0">
+            <a:spAutoFit/>
+          </a:bodyPr>
+          <a:lstStyle/>
+          <a:p>
+            <a:pPr algn="ctr"/>
+            <a:r>
+              <a:rPr lang="es-ES" sz="2400" b="1" dirty="0" smtClean="0">
+                <a:solidFill>
+                  <a:schemeClr val="accent2">
+                    <a:lumMod val="50000"/>
+                  </a:schemeClr>
+                </a:solidFill>
+                <a:latin typeface="Bahnschrift Light" panose="020B0502040204020203" pitchFamily="34" charset="0"/>
+              </a:rPr>
+              <a:t>Lucas Olivera</a:t>
+            </a:r>
+            <a:endParaRPr lang="es-ES" sz="2400" b="1" dirty="0">
+              <a:solidFill>
+                <a:schemeClr val="accent2">
+                  <a:lumMod val="50000"/>
+                </a:schemeClr>
+              </a:solidFill>
+              <a:latin typeface="Bahnschrift Light" panose="020B0502040204020203" pitchFamily="34" charset="0"/>
+            </a:endParaRPr>
+          </a:p>
+          <a:p>
+            <a:pPr algn="ctr"/>
+            <a:r>
+              <a:rPr lang="es-ES" dirty="0" smtClean="0">
+                <a:solidFill>
+                  <a:schemeClr val="accent2">
+                    <a:lumMod val="50000"/>
+                  </a:schemeClr>
+                </a:solidFill>
+                <a:latin typeface="Bahnschrift Light" panose="020B0502040204020203" pitchFamily="34" charset="0"/>
+              </a:rPr>
+              <a:t>*QA Tester en Tata </a:t>
+            </a:r>
+            <a:r>
+              <a:rPr lang="es-ES" dirty="0" err="1" smtClean="0">
+                <a:solidFill>
+                  <a:schemeClr val="accent2">
+                    <a:lumMod val="50000"/>
+                  </a:schemeClr>
+                </a:solidFill>
+                <a:latin typeface="Bahnschrift Light" panose="020B0502040204020203" pitchFamily="34" charset="0"/>
+              </a:rPr>
+              <a:t>Consultancy</a:t>
+            </a:r>
+            <a:r>
+              <a:rPr lang="es-ES" dirty="0" smtClean="0">
+                <a:solidFill>
+                  <a:schemeClr val="accent2">
+                    <a:lumMod val="50000"/>
+                  </a:schemeClr>
+                </a:solidFill>
+                <a:latin typeface="Bahnschrift Light" panose="020B0502040204020203" pitchFamily="34" charset="0"/>
+              </a:rPr>
+              <a:t> </a:t>
+            </a:r>
+            <a:r>
+              <a:rPr lang="es-ES" dirty="0" err="1" smtClean="0">
+                <a:solidFill>
+                  <a:schemeClr val="accent2">
+                    <a:lumMod val="50000"/>
+                  </a:schemeClr>
+                </a:solidFill>
+                <a:latin typeface="Bahnschrift Light" panose="020B0502040204020203" pitchFamily="34" charset="0"/>
+              </a:rPr>
+              <a:t>Services</a:t>
+            </a:r>
+            <a:r>
+              <a:rPr lang="es-ES" dirty="0" smtClean="0">
+                <a:solidFill>
+                  <a:schemeClr val="accent2">
+                    <a:lumMod val="50000"/>
+                  </a:schemeClr>
+                </a:solidFill>
+                <a:latin typeface="Bahnschrift Light" panose="020B0502040204020203" pitchFamily="34" charset="0"/>
+              </a:rPr>
+              <a:t>.</a:t>
+            </a:r>
+            <a:endParaRPr lang="es-ES" dirty="0">
+              <a:solidFill>
+                <a:schemeClr val="accent2">
+                  <a:lumMod val="50000"/>
+                </a:schemeClr>
+              </a:solidFill>
+              <a:latin typeface="Bahnschrift Light" panose="020B0502040204020203" pitchFamily="34" charset="0"/>
+            </a:endParaRPr>
+          </a:p>
+          <a:p>
+            <a:endParaRPr lang="es-ES" dirty="0"/>
+          </a:p>
+        </p:txBody>
+      </p:sp>
+      <p:pic>
+        <p:nvPicPr>
+          <p:cNvPr id="7" name="Imagen 6"/>
+          <p:cNvPicPr>
+            <a:picLocks noChangeAspect="1"/>
+          </p:cNvPicPr>
+          <p:nvPr/>
+        </p:nvPicPr>
+        <p:blipFill>
+          <a:blip r:embed="rId8">
+            <a:extLst>
+              <a:ext uri="{28A0092B-C50C-407E-A947-70E740481C1C}">
+                <a14:useLocalDpi xmlns:a14="http://schemas.microsoft.com/office/drawing/2010/main" val="0"/>
+              </a:ext>
+            </a:extLst>
+          </a:blip>
+          <a:stretch>
+            <a:fillRect/>
+          </a:stretch>
+        </p:blipFill>
+        <p:spPr>
+          <a:xfrm>
+            <a:off x="6280062" y="2275723"/>
+            <a:ext cx="1518154" cy="1959845"/>
+          </a:xfrm>
+          <a:prstGeom prst="rect">
+            <a:avLst/>
+          </a:prstGeom>
+        </p:spPr>
+      </p:pic>
+      <p:pic>
+        <p:nvPicPr>
+          <p:cNvPr id="8" name="Imagen 7"/>
+          <p:cNvPicPr>
+            <a:picLocks noChangeAspect="1"/>
+          </p:cNvPicPr>
+          <p:nvPr/>
+        </p:nvPicPr>
+        <p:blipFill>
+          <a:blip r:embed="rId9">
+            <a:extLst>
+              <a:ext uri="{28A0092B-C50C-407E-A947-70E740481C1C}">
+                <a14:useLocalDpi xmlns:a14="http://schemas.microsoft.com/office/drawing/2010/main" val="0"/>
+              </a:ext>
+            </a:extLst>
+          </a:blip>
+          <a:stretch>
+            <a:fillRect/>
+          </a:stretch>
+        </p:blipFill>
+        <p:spPr>
+          <a:xfrm>
+            <a:off x="8499717" y="2275723"/>
+            <a:ext cx="1498015" cy="1942590"/>
+          </a:xfrm>
+          <a:prstGeom prst="rect">
+            <a:avLst/>
+          </a:prstGeom>
+        </p:spPr>
+      </p:pic>
+      <p:sp>
+        <p:nvSpPr>
+          <p:cNvPr id="13" name="CuadroTexto 12"/>
+          <p:cNvSpPr txBox="1"/>
+          <p:nvPr/>
+        </p:nvSpPr>
+        <p:spPr>
+          <a:xfrm>
+            <a:off x="5869764" y="4264479"/>
+            <a:ext cx="2338750" cy="1015663"/>
+          </a:xfrm>
+          <a:prstGeom prst="rect">
+            <a:avLst/>
+          </a:prstGeom>
+          <a:noFill/>
+        </p:spPr>
+        <p:txBody>
+          <a:bodyPr wrap="square" rtlCol="0">
+            <a:spAutoFit/>
+          </a:bodyPr>
+          <a:lstStyle/>
+          <a:p>
+            <a:pPr algn="ctr"/>
+            <a:r>
+              <a:rPr lang="es-ES" sz="2400" b="1" dirty="0" err="1" smtClean="0">
+                <a:solidFill>
+                  <a:schemeClr val="accent2">
+                    <a:lumMod val="50000"/>
+                  </a:schemeClr>
+                </a:solidFill>
+                <a:latin typeface="Bahnschrift Light" panose="020B0502040204020203" pitchFamily="34" charset="0"/>
+              </a:rPr>
+              <a:t>Angeles</a:t>
+            </a:r>
+            <a:r>
+              <a:rPr lang="es-ES" sz="2400" b="1" dirty="0" smtClean="0">
+                <a:solidFill>
+                  <a:schemeClr val="accent2">
+                    <a:lumMod val="50000"/>
+                  </a:schemeClr>
+                </a:solidFill>
+                <a:latin typeface="Bahnschrift Light" panose="020B0502040204020203" pitchFamily="34" charset="0"/>
+              </a:rPr>
+              <a:t> </a:t>
+            </a:r>
+            <a:r>
+              <a:rPr lang="es-ES" sz="2400" b="1" dirty="0">
+                <a:solidFill>
+                  <a:schemeClr val="accent2">
+                    <a:lumMod val="50000"/>
+                  </a:schemeClr>
+                </a:solidFill>
+                <a:latin typeface="Bahnschrift Light" panose="020B0502040204020203" pitchFamily="34" charset="0"/>
+              </a:rPr>
+              <a:t>Nieves</a:t>
+            </a:r>
+          </a:p>
+          <a:p>
+            <a:pPr algn="ctr"/>
+            <a:r>
+              <a:rPr lang="es-ES" dirty="0">
+                <a:solidFill>
+                  <a:schemeClr val="accent2">
+                    <a:lumMod val="50000"/>
+                  </a:schemeClr>
+                </a:solidFill>
+                <a:latin typeface="Bahnschrift Light" panose="020B0502040204020203" pitchFamily="34" charset="0"/>
+              </a:rPr>
+              <a:t>*Estudiante </a:t>
+            </a:r>
+            <a:r>
+              <a:rPr lang="es-ES" dirty="0" smtClean="0">
+                <a:solidFill>
+                  <a:schemeClr val="accent2">
+                    <a:lumMod val="50000"/>
+                  </a:schemeClr>
+                </a:solidFill>
+                <a:latin typeface="Bahnschrift Light" panose="020B0502040204020203" pitchFamily="34" charset="0"/>
+              </a:rPr>
+              <a:t>Analista TI</a:t>
+            </a:r>
+            <a:endParaRPr lang="es-ES" dirty="0">
+              <a:solidFill>
+                <a:schemeClr val="accent2">
+                  <a:lumMod val="50000"/>
+                </a:schemeClr>
+              </a:solidFill>
+              <a:latin typeface="Bahnschrift Light" panose="020B0502040204020203" pitchFamily="34" charset="0"/>
+            </a:endParaRPr>
+          </a:p>
+        </p:txBody>
+      </p:sp>
+      <p:sp>
+        <p:nvSpPr>
+          <p:cNvPr id="14" name="CuadroTexto 13"/>
+          <p:cNvSpPr txBox="1"/>
+          <p:nvPr/>
+        </p:nvSpPr>
+        <p:spPr>
+          <a:xfrm>
+            <a:off x="8298978" y="4235568"/>
+            <a:ext cx="2151176" cy="1015663"/>
+          </a:xfrm>
+          <a:prstGeom prst="rect">
+            <a:avLst/>
+          </a:prstGeom>
+          <a:noFill/>
+        </p:spPr>
+        <p:txBody>
+          <a:bodyPr wrap="square" rtlCol="0">
+            <a:spAutoFit/>
+          </a:bodyPr>
+          <a:lstStyle/>
+          <a:p>
+            <a:pPr algn="ctr"/>
+            <a:r>
+              <a:rPr lang="es-ES" sz="2400" b="1" dirty="0" smtClean="0">
+                <a:solidFill>
+                  <a:schemeClr val="accent2">
+                    <a:lumMod val="50000"/>
+                  </a:schemeClr>
+                </a:solidFill>
+                <a:latin typeface="Bahnschrift Light" panose="020B0502040204020203" pitchFamily="34" charset="0"/>
+              </a:rPr>
+              <a:t>Juan Rolando</a:t>
+            </a:r>
+            <a:endParaRPr lang="es-ES" sz="2400" b="1" dirty="0">
+              <a:solidFill>
+                <a:schemeClr val="accent2">
+                  <a:lumMod val="50000"/>
+                </a:schemeClr>
+              </a:solidFill>
+              <a:latin typeface="Bahnschrift Light" panose="020B0502040204020203" pitchFamily="34" charset="0"/>
+            </a:endParaRPr>
+          </a:p>
+          <a:p>
+            <a:pPr algn="ctr"/>
+            <a:r>
+              <a:rPr lang="es-ES" dirty="0" smtClean="0">
+                <a:solidFill>
+                  <a:schemeClr val="accent2">
+                    <a:lumMod val="50000"/>
+                  </a:schemeClr>
+                </a:solidFill>
+                <a:latin typeface="Bahnschrift Light" panose="020B0502040204020203" pitchFamily="34" charset="0"/>
+              </a:rPr>
+              <a:t>*Programador</a:t>
+            </a:r>
+            <a:endParaRPr lang="es-ES" dirty="0">
+              <a:solidFill>
+                <a:schemeClr val="accent2">
+                  <a:lumMod val="50000"/>
+                </a:schemeClr>
+              </a:solidFill>
+              <a:latin typeface="Bahnschrift Light" panose="020B0502040204020203" pitchFamily="34" charset="0"/>
+            </a:endParaRPr>
+          </a:p>
+          <a:p>
+            <a:endParaRPr lang="es-ES" dirty="0"/>
+          </a:p>
+        </p:txBody>
+      </p:sp>
     </p:spTree>
     <p:extLst>
       <p:ext uri="{BB962C8B-B14F-4D97-AF65-F5344CB8AC3E}">
-        <p14:creationId xmlns:p14="http://schemas.microsoft.com/office/powerpoint/2010/main" val="4268221211"/>
+        <p14:creationId xmlns:p14="http://schemas.microsoft.com/office/powerpoint/2010/main" val="2665315122"/>
       </p:ext>
     </p:extLst>
   </p:cSld>
@@ -6246,183 +6907,9 @@
   <p:timing>
     <p:tnLst>
       <p:par>
-        <p:cTn id="1" dur="indefinite" restart="never" nodeType="tmRoot">
-          <p:childTnLst>
-            <p:seq concurrent="1" nextAc="seek">
-              <p:cTn id="2" dur="indefinite" nodeType="mainSeq">
-                <p:childTnLst>
-                  <p:par>
-                    <p:cTn id="3" fill="hold">
-                      <p:stCondLst>
-                        <p:cond delay="indefinite"/>
-                        <p:cond evt="onBegin" delay="0">
-                          <p:tn val="2"/>
-                        </p:cond>
-                      </p:stCondLst>
-                      <p:childTnLst>
-                        <p:par>
-                          <p:cTn id="4" fill="hold">
-                            <p:stCondLst>
-                              <p:cond delay="0"/>
-                            </p:stCondLst>
-                            <p:childTnLst>
-                              <p:par>
-                                <p:cTn id="5" presetID="14" presetClass="entr" presetSubtype="10" fill="hold" nodeType="withEffect">
-                                  <p:stCondLst>
-                                    <p:cond delay="0"/>
-                                  </p:stCondLst>
-                                  <p:childTnLst>
-                                    <p:set>
-                                      <p:cBhvr>
-                                        <p:cTn id="6" dur="1" fill="hold">
-                                          <p:stCondLst>
-                                            <p:cond delay="0"/>
-                                          </p:stCondLst>
-                                        </p:cTn>
-                                        <p:tgtEl>
-                                          <p:spTgt spid="2"/>
-                                        </p:tgtEl>
-                                        <p:attrNameLst>
-                                          <p:attrName>style.visibility</p:attrName>
-                                        </p:attrNameLst>
-                                      </p:cBhvr>
-                                      <p:to>
-                                        <p:strVal val="visible"/>
-                                      </p:to>
-                                    </p:set>
-                                    <p:animEffect transition="in" filter="randombar(horizontal)">
-                                      <p:cBhvr>
-                                        <p:cTn id="7" dur="750"/>
-                                        <p:tgtEl>
-                                          <p:spTgt spid="2"/>
-                                        </p:tgtEl>
-                                      </p:cBhvr>
-                                    </p:animEffect>
-                                  </p:childTnLst>
-                                </p:cTn>
-                              </p:par>
-                            </p:childTnLst>
-                          </p:cTn>
-                        </p:par>
-                      </p:childTnLst>
-                    </p:cTn>
-                  </p:par>
-                  <p:par>
-                    <p:cTn id="8" fill="hold">
-                      <p:stCondLst>
-                        <p:cond delay="indefinite"/>
-                      </p:stCondLst>
-                      <p:childTnLst>
-                        <p:par>
-                          <p:cTn id="9" fill="hold">
-                            <p:stCondLst>
-                              <p:cond delay="0"/>
-                            </p:stCondLst>
-                            <p:childTnLst>
-                              <p:par>
-                                <p:cTn id="10" presetID="1" presetClass="entr" presetSubtype="0" fill="hold" grpId="1" nodeType="clickEffect">
-                                  <p:stCondLst>
-                                    <p:cond delay="0"/>
-                                  </p:stCondLst>
-                                  <p:iterate type="lt">
-                                    <p:tmAbs val="0"/>
-                                  </p:iterate>
-                                  <p:childTnLst>
-                                    <p:set>
-                                      <p:cBhvr>
-                                        <p:cTn id="11" dur="1" fill="hold">
-                                          <p:stCondLst>
-                                            <p:cond delay="0"/>
-                                          </p:stCondLst>
-                                        </p:cTn>
-                                        <p:tgtEl>
-                                          <p:spTgt spid="8">
-                                            <p:txEl>
-                                              <p:pRg st="0" end="0"/>
-                                            </p:txEl>
-                                          </p:spTgt>
-                                        </p:tgtEl>
-                                        <p:attrNameLst>
-                                          <p:attrName>style.visibility</p:attrName>
-                                        </p:attrNameLst>
-                                      </p:cBhvr>
-                                      <p:to>
-                                        <p:strVal val="visible"/>
-                                      </p:to>
-                                    </p:set>
-                                  </p:childTnLst>
-                                </p:cTn>
-                              </p:par>
-                            </p:childTnLst>
-                          </p:cTn>
-                        </p:par>
-                        <p:par>
-                          <p:cTn id="12" fill="hold">
-                            <p:stCondLst>
-                              <p:cond delay="0"/>
-                            </p:stCondLst>
-                            <p:childTnLst>
-                              <p:par>
-                                <p:cTn id="13" presetID="18" presetClass="emph" presetSubtype="0" fill="hold" grpId="0" nodeType="afterEffect">
-                                  <p:stCondLst>
-                                    <p:cond delay="0"/>
-                                  </p:stCondLst>
-                                  <p:iterate type="lt">
-                                    <p:tmPct val="4000"/>
-                                  </p:iterate>
-                                  <p:childTnLst>
-                                    <p:set>
-                                      <p:cBhvr override="childStyle">
-                                        <p:cTn id="14" dur="1000" fill="hold"/>
-                                        <p:tgtEl>
-                                          <p:spTgt spid="8">
-                                            <p:txEl>
-                                              <p:pRg st="0" end="0"/>
-                                            </p:txEl>
-                                          </p:spTgt>
-                                        </p:tgtEl>
-                                        <p:attrNameLst>
-                                          <p:attrName>style.textDecorationUnderline</p:attrName>
-                                        </p:attrNameLst>
-                                      </p:cBhvr>
-                                      <p:to>
-                                        <p:strVal val="true"/>
-                                      </p:to>
-                                    </p:set>
-                                  </p:childTnLst>
-                                </p:cTn>
-                              </p:par>
-                            </p:childTnLst>
-                          </p:cTn>
-                        </p:par>
-                      </p:childTnLst>
-                    </p:cTn>
-                  </p:par>
-                </p:childTnLst>
-              </p:cTn>
-              <p:prevCondLst>
-                <p:cond evt="onPrev" delay="0">
-                  <p:tgtEl>
-                    <p:sldTgt/>
-                  </p:tgtEl>
-                </p:cond>
-              </p:prevCondLst>
-              <p:nextCondLst>
-                <p:cond evt="onNext" delay="0">
-                  <p:tgtEl>
-                    <p:sldTgt/>
-                  </p:tgtEl>
-                </p:cond>
-              </p:nextCondLst>
-            </p:seq>
-          </p:childTnLst>
-        </p:cTn>
+        <p:cTn id="1" dur="indefinite" restart="never" nodeType="tmRoot"/>
       </p:par>
     </p:tnLst>
-    <p:bldLst>
-      <p:bldP spid="8" grpId="0" build="p"/>
-      <p:bldP spid="8" grpId="1" build="p"/>
-    </p:bldLst>
   </p:timing>
 </p:sld>
 </file>
@@ -6563,36 +7050,51 @@
           </a:prstGeom>
         </p:spPr>
       </p:pic>
-      <p:pic>
-        <p:nvPicPr>
-          <p:cNvPr id="2" name="Imagen 1"/>
-          <p:cNvPicPr>
-            <a:picLocks noChangeAspect="1"/>
-          </p:cNvPicPr>
+      <p:sp>
+        <p:nvSpPr>
+          <p:cNvPr id="3" name="CuadroTexto 2"/>
+          <p:cNvSpPr txBox="1"/>
           <p:nvPr/>
-        </p:nvPicPr>
-        <p:blipFill>
-          <a:blip r:embed="rId6">
-            <a:extLst>
-              <a:ext uri="{28A0092B-C50C-407E-A947-70E740481C1C}">
-                <a14:useLocalDpi xmlns:a14="http://schemas.microsoft.com/office/drawing/2010/main" val="0"/>
-              </a:ext>
-            </a:extLst>
-          </a:blip>
-          <a:stretch>
-            <a:fillRect/>
-          </a:stretch>
-        </p:blipFill>
-        <p:spPr>
-          <a:xfrm>
-            <a:off x="1051380" y="1268361"/>
-            <a:ext cx="10058400" cy="5005086"/>
+        </p:nvSpPr>
+        <p:spPr>
+          <a:xfrm>
+            <a:off x="2846222" y="3101105"/>
+            <a:ext cx="7080138" cy="523220"/>
           </a:xfrm>
           <a:prstGeom prst="rect">
             <a:avLst/>
           </a:prstGeom>
-        </p:spPr>
-      </p:pic>
+          <a:noFill/>
+        </p:spPr>
+        <p:txBody>
+          <a:bodyPr wrap="square" rtlCol="0">
+            <a:spAutoFit/>
+          </a:bodyPr>
+          <a:lstStyle/>
+          <a:p>
+            <a:pPr algn="ctr"/>
+            <a:r>
+              <a:rPr lang="es-ES" sz="2800" b="1" dirty="0" smtClean="0">
+                <a:solidFill>
+                  <a:schemeClr val="accent2">
+                    <a:lumMod val="50000"/>
+                  </a:schemeClr>
+                </a:solidFill>
+                <a:latin typeface="Bahnschrift Light" panose="020B0502040204020203" pitchFamily="34" charset="0"/>
+              </a:rPr>
+              <a:t>¿Cómo surgió?</a:t>
+            </a:r>
+            <a:endParaRPr lang="es-ES" sz="2800" b="1" dirty="0">
+              <a:solidFill>
+                <a:schemeClr val="accent2">
+                  <a:lumMod val="50000"/>
+                </a:schemeClr>
+              </a:solidFill>
+              <a:latin typeface="Bahnschrift Light" panose="020B0502040204020203" pitchFamily="34" charset="0"/>
+            </a:endParaRPr>
+          </a:p>
+        </p:txBody>
+      </p:sp>
     </p:spTree>
     <p:extLst>
       <p:ext uri="{BB962C8B-B14F-4D97-AF65-F5344CB8AC3E}">
@@ -6751,1198 +7253,6 @@
       </p:pic>
       <p:pic>
         <p:nvPicPr>
-          <p:cNvPr id="14" name="Imagen 13"/>
-          <p:cNvPicPr>
-            <a:picLocks noChangeAspect="1"/>
-          </p:cNvPicPr>
-          <p:nvPr/>
-        </p:nvPicPr>
-        <p:blipFill>
-          <a:blip r:embed="rId6">
-            <a:extLst>
-              <a:ext uri="{28A0092B-C50C-407E-A947-70E740481C1C}">
-                <a14:useLocalDpi xmlns:a14="http://schemas.microsoft.com/office/drawing/2010/main" val="0"/>
-              </a:ext>
-            </a:extLst>
-          </a:blip>
-          <a:stretch>
-            <a:fillRect/>
-          </a:stretch>
-        </p:blipFill>
-        <p:spPr>
-          <a:xfrm rot="789676">
-            <a:off x="7515606" y="1609613"/>
-            <a:ext cx="3027426" cy="1699608"/>
-          </a:xfrm>
-          <a:prstGeom prst="rect">
-            <a:avLst/>
-          </a:prstGeom>
-        </p:spPr>
-      </p:pic>
-      <p:pic>
-        <p:nvPicPr>
-          <p:cNvPr id="15" name="Imagen 14"/>
-          <p:cNvPicPr>
-            <a:picLocks noChangeAspect="1"/>
-          </p:cNvPicPr>
-          <p:nvPr/>
-        </p:nvPicPr>
-        <p:blipFill>
-          <a:blip r:embed="rId7">
-            <a:extLst>
-              <a:ext uri="{28A0092B-C50C-407E-A947-70E740481C1C}">
-                <a14:useLocalDpi xmlns:a14="http://schemas.microsoft.com/office/drawing/2010/main" val="0"/>
-              </a:ext>
-            </a:extLst>
-          </a:blip>
-          <a:stretch>
-            <a:fillRect/>
-          </a:stretch>
-        </p:blipFill>
-        <p:spPr>
-          <a:xfrm rot="21038935">
-            <a:off x="573746" y="1417133"/>
-            <a:ext cx="5064270" cy="2583811"/>
-          </a:xfrm>
-          <a:prstGeom prst="rect">
-            <a:avLst/>
-          </a:prstGeom>
-        </p:spPr>
-      </p:pic>
-      <p:pic>
-        <p:nvPicPr>
-          <p:cNvPr id="16" name="Imagen 15"/>
-          <p:cNvPicPr>
-            <a:picLocks noChangeAspect="1"/>
-          </p:cNvPicPr>
-          <p:nvPr/>
-        </p:nvPicPr>
-        <p:blipFill>
-          <a:blip r:embed="rId8">
-            <a:extLst>
-              <a:ext uri="{28A0092B-C50C-407E-A947-70E740481C1C}">
-                <a14:useLocalDpi xmlns:a14="http://schemas.microsoft.com/office/drawing/2010/main" val="0"/>
-              </a:ext>
-            </a:extLst>
-          </a:blip>
-          <a:stretch>
-            <a:fillRect/>
-          </a:stretch>
-        </p:blipFill>
-        <p:spPr>
-          <a:xfrm>
-            <a:off x="6895345" y="3394578"/>
-            <a:ext cx="4581144" cy="3054096"/>
-          </a:xfrm>
-          <a:prstGeom prst="rect">
-            <a:avLst/>
-          </a:prstGeom>
-        </p:spPr>
-      </p:pic>
-      <p:pic>
-        <p:nvPicPr>
-          <p:cNvPr id="17" name="Imagen 16"/>
-          <p:cNvPicPr>
-            <a:picLocks noChangeAspect="1"/>
-          </p:cNvPicPr>
-          <p:nvPr/>
-        </p:nvPicPr>
-        <p:blipFill>
-          <a:blip r:embed="rId9">
-            <a:extLst>
-              <a:ext uri="{28A0092B-C50C-407E-A947-70E740481C1C}">
-                <a14:useLocalDpi xmlns:a14="http://schemas.microsoft.com/office/drawing/2010/main" val="0"/>
-              </a:ext>
-            </a:extLst>
-          </a:blip>
-          <a:stretch>
-            <a:fillRect/>
-          </a:stretch>
-        </p:blipFill>
-        <p:spPr>
-          <a:xfrm>
-            <a:off x="887919" y="4182015"/>
-            <a:ext cx="3553223" cy="2315147"/>
-          </a:xfrm>
-          <a:prstGeom prst="rect">
-            <a:avLst/>
-          </a:prstGeom>
-        </p:spPr>
-      </p:pic>
-      <p:pic>
-        <p:nvPicPr>
-          <p:cNvPr id="18" name="Imagen 17"/>
-          <p:cNvPicPr>
-            <a:picLocks noChangeAspect="1"/>
-          </p:cNvPicPr>
-          <p:nvPr/>
-        </p:nvPicPr>
-        <p:blipFill>
-          <a:blip r:embed="rId10">
-            <a:extLst>
-              <a:ext uri="{28A0092B-C50C-407E-A947-70E740481C1C}">
-                <a14:useLocalDpi xmlns:a14="http://schemas.microsoft.com/office/drawing/2010/main" val="0"/>
-              </a:ext>
-            </a:extLst>
-          </a:blip>
-          <a:stretch>
-            <a:fillRect/>
-          </a:stretch>
-        </p:blipFill>
-        <p:spPr>
-          <a:xfrm rot="642358">
-            <a:off x="3661772" y="2566748"/>
-            <a:ext cx="4408827" cy="2543554"/>
-          </a:xfrm>
-          <a:prstGeom prst="rect">
-            <a:avLst/>
-          </a:prstGeom>
-        </p:spPr>
-      </p:pic>
-      <p:pic>
-        <p:nvPicPr>
-          <p:cNvPr id="19" name="Imagen 18"/>
-          <p:cNvPicPr>
-            <a:picLocks noChangeAspect="1"/>
-          </p:cNvPicPr>
-          <p:nvPr/>
-        </p:nvPicPr>
-        <p:blipFill>
-          <a:blip r:embed="rId11">
-            <a:extLst>
-              <a:ext uri="{28A0092B-C50C-407E-A947-70E740481C1C}">
-                <a14:useLocalDpi xmlns:a14="http://schemas.microsoft.com/office/drawing/2010/main" val="0"/>
-              </a:ext>
-            </a:extLst>
-          </a:blip>
-          <a:stretch>
-            <a:fillRect/>
-          </a:stretch>
-        </p:blipFill>
-        <p:spPr>
-          <a:xfrm rot="21223781">
-            <a:off x="4270633" y="4414119"/>
-            <a:ext cx="3442984" cy="1926509"/>
-          </a:xfrm>
-          <a:prstGeom prst="rect">
-            <a:avLst/>
-          </a:prstGeom>
-        </p:spPr>
-      </p:pic>
-      <p:pic>
-        <p:nvPicPr>
-          <p:cNvPr id="20" name="Imagen 19"/>
-          <p:cNvPicPr>
-            <a:picLocks noChangeAspect="1"/>
-          </p:cNvPicPr>
-          <p:nvPr/>
-        </p:nvPicPr>
-        <p:blipFill>
-          <a:blip r:embed="rId12">
-            <a:extLst>
-              <a:ext uri="{28A0092B-C50C-407E-A947-70E740481C1C}">
-                <a14:useLocalDpi xmlns:a14="http://schemas.microsoft.com/office/drawing/2010/main" val="0"/>
-              </a:ext>
-            </a:extLst>
-          </a:blip>
-          <a:stretch>
-            <a:fillRect/>
-          </a:stretch>
-        </p:blipFill>
-        <p:spPr>
-          <a:xfrm>
-            <a:off x="5033700" y="846858"/>
-            <a:ext cx="2724808" cy="2043606"/>
-          </a:xfrm>
-          <a:prstGeom prst="rect">
-            <a:avLst/>
-          </a:prstGeom>
-        </p:spPr>
-      </p:pic>
-    </p:spTree>
-    <p:extLst>
-      <p:ext uri="{BB962C8B-B14F-4D97-AF65-F5344CB8AC3E}">
-        <p14:creationId xmlns:p14="http://schemas.microsoft.com/office/powerpoint/2010/main" val="3117239801"/>
-      </p:ext>
-    </p:extLst>
-  </p:cSld>
-  <p:clrMapOvr>
-    <a:masterClrMapping/>
-  </p:clrMapOvr>
-  <p:timing>
-    <p:tnLst>
-      <p:par>
-        <p:cTn id="1" dur="indefinite" restart="never" nodeType="tmRoot">
-          <p:childTnLst>
-            <p:seq concurrent="1" nextAc="seek">
-              <p:cTn id="2" dur="indefinite" nodeType="mainSeq">
-                <p:childTnLst>
-                  <p:par>
-                    <p:cTn id="3" fill="hold">
-                      <p:stCondLst>
-                        <p:cond delay="indefinite"/>
-                        <p:cond evt="onBegin" delay="0">
-                          <p:tn val="2"/>
-                        </p:cond>
-                      </p:stCondLst>
-                      <p:childTnLst>
-                        <p:par>
-                          <p:cTn id="4" fill="hold">
-                            <p:stCondLst>
-                              <p:cond delay="0"/>
-                            </p:stCondLst>
-                            <p:childTnLst>
-                              <p:par>
-                                <p:cTn id="5" presetID="31" presetClass="entr" presetSubtype="0" fill="hold" nodeType="withEffect">
-                                  <p:stCondLst>
-                                    <p:cond delay="0"/>
-                                  </p:stCondLst>
-                                  <p:childTnLst>
-                                    <p:set>
-                                      <p:cBhvr>
-                                        <p:cTn id="6" dur="1" fill="hold">
-                                          <p:stCondLst>
-                                            <p:cond delay="0"/>
-                                          </p:stCondLst>
-                                        </p:cTn>
-                                        <p:tgtEl>
-                                          <p:spTgt spid="14"/>
-                                        </p:tgtEl>
-                                        <p:attrNameLst>
-                                          <p:attrName>style.visibility</p:attrName>
-                                        </p:attrNameLst>
-                                      </p:cBhvr>
-                                      <p:to>
-                                        <p:strVal val="visible"/>
-                                      </p:to>
-                                    </p:set>
-                                    <p:anim calcmode="lin" valueType="num">
-                                      <p:cBhvr>
-                                        <p:cTn id="7" dur="1000" fill="hold"/>
-                                        <p:tgtEl>
-                                          <p:spTgt spid="14"/>
-                                        </p:tgtEl>
-                                        <p:attrNameLst>
-                                          <p:attrName>ppt_w</p:attrName>
-                                        </p:attrNameLst>
-                                      </p:cBhvr>
-                                      <p:tavLst>
-                                        <p:tav tm="0">
-                                          <p:val>
-                                            <p:fltVal val="0"/>
-                                          </p:val>
-                                        </p:tav>
-                                        <p:tav tm="100000">
-                                          <p:val>
-                                            <p:strVal val="#ppt_w"/>
-                                          </p:val>
-                                        </p:tav>
-                                      </p:tavLst>
-                                    </p:anim>
-                                    <p:anim calcmode="lin" valueType="num">
-                                      <p:cBhvr>
-                                        <p:cTn id="8" dur="1000" fill="hold"/>
-                                        <p:tgtEl>
-                                          <p:spTgt spid="14"/>
-                                        </p:tgtEl>
-                                        <p:attrNameLst>
-                                          <p:attrName>ppt_h</p:attrName>
-                                        </p:attrNameLst>
-                                      </p:cBhvr>
-                                      <p:tavLst>
-                                        <p:tav tm="0">
-                                          <p:val>
-                                            <p:fltVal val="0"/>
-                                          </p:val>
-                                        </p:tav>
-                                        <p:tav tm="100000">
-                                          <p:val>
-                                            <p:strVal val="#ppt_h"/>
-                                          </p:val>
-                                        </p:tav>
-                                      </p:tavLst>
-                                    </p:anim>
-                                    <p:anim calcmode="lin" valueType="num">
-                                      <p:cBhvr>
-                                        <p:cTn id="9" dur="1000" fill="hold"/>
-                                        <p:tgtEl>
-                                          <p:spTgt spid="14"/>
-                                        </p:tgtEl>
-                                        <p:attrNameLst>
-                                          <p:attrName>style.rotation</p:attrName>
-                                        </p:attrNameLst>
-                                      </p:cBhvr>
-                                      <p:tavLst>
-                                        <p:tav tm="0">
-                                          <p:val>
-                                            <p:fltVal val="90"/>
-                                          </p:val>
-                                        </p:tav>
-                                        <p:tav tm="100000">
-                                          <p:val>
-                                            <p:fltVal val="0"/>
-                                          </p:val>
-                                        </p:tav>
-                                      </p:tavLst>
-                                    </p:anim>
-                                    <p:animEffect transition="in" filter="fade">
-                                      <p:cBhvr>
-                                        <p:cTn id="10" dur="1000"/>
-                                        <p:tgtEl>
-                                          <p:spTgt spid="14"/>
-                                        </p:tgtEl>
-                                      </p:cBhvr>
-                                    </p:animEffect>
-                                  </p:childTnLst>
-                                </p:cTn>
-                              </p:par>
-                            </p:childTnLst>
-                          </p:cTn>
-                        </p:par>
-                        <p:par>
-                          <p:cTn id="11" fill="hold">
-                            <p:stCondLst>
-                              <p:cond delay="1000"/>
-                            </p:stCondLst>
-                            <p:childTnLst>
-                              <p:par>
-                                <p:cTn id="12" presetID="31" presetClass="entr" presetSubtype="0" fill="hold" nodeType="afterEffect">
-                                  <p:stCondLst>
-                                    <p:cond delay="0"/>
-                                  </p:stCondLst>
-                                  <p:childTnLst>
-                                    <p:set>
-                                      <p:cBhvr>
-                                        <p:cTn id="13" dur="1" fill="hold">
-                                          <p:stCondLst>
-                                            <p:cond delay="0"/>
-                                          </p:stCondLst>
-                                        </p:cTn>
-                                        <p:tgtEl>
-                                          <p:spTgt spid="15"/>
-                                        </p:tgtEl>
-                                        <p:attrNameLst>
-                                          <p:attrName>style.visibility</p:attrName>
-                                        </p:attrNameLst>
-                                      </p:cBhvr>
-                                      <p:to>
-                                        <p:strVal val="visible"/>
-                                      </p:to>
-                                    </p:set>
-                                    <p:anim calcmode="lin" valueType="num">
-                                      <p:cBhvr>
-                                        <p:cTn id="14" dur="1000" fill="hold"/>
-                                        <p:tgtEl>
-                                          <p:spTgt spid="15"/>
-                                        </p:tgtEl>
-                                        <p:attrNameLst>
-                                          <p:attrName>ppt_w</p:attrName>
-                                        </p:attrNameLst>
-                                      </p:cBhvr>
-                                      <p:tavLst>
-                                        <p:tav tm="0">
-                                          <p:val>
-                                            <p:fltVal val="0"/>
-                                          </p:val>
-                                        </p:tav>
-                                        <p:tav tm="100000">
-                                          <p:val>
-                                            <p:strVal val="#ppt_w"/>
-                                          </p:val>
-                                        </p:tav>
-                                      </p:tavLst>
-                                    </p:anim>
-                                    <p:anim calcmode="lin" valueType="num">
-                                      <p:cBhvr>
-                                        <p:cTn id="15" dur="1000" fill="hold"/>
-                                        <p:tgtEl>
-                                          <p:spTgt spid="15"/>
-                                        </p:tgtEl>
-                                        <p:attrNameLst>
-                                          <p:attrName>ppt_h</p:attrName>
-                                        </p:attrNameLst>
-                                      </p:cBhvr>
-                                      <p:tavLst>
-                                        <p:tav tm="0">
-                                          <p:val>
-                                            <p:fltVal val="0"/>
-                                          </p:val>
-                                        </p:tav>
-                                        <p:tav tm="100000">
-                                          <p:val>
-                                            <p:strVal val="#ppt_h"/>
-                                          </p:val>
-                                        </p:tav>
-                                      </p:tavLst>
-                                    </p:anim>
-                                    <p:anim calcmode="lin" valueType="num">
-                                      <p:cBhvr>
-                                        <p:cTn id="16" dur="1000" fill="hold"/>
-                                        <p:tgtEl>
-                                          <p:spTgt spid="15"/>
-                                        </p:tgtEl>
-                                        <p:attrNameLst>
-                                          <p:attrName>style.rotation</p:attrName>
-                                        </p:attrNameLst>
-                                      </p:cBhvr>
-                                      <p:tavLst>
-                                        <p:tav tm="0">
-                                          <p:val>
-                                            <p:fltVal val="90"/>
-                                          </p:val>
-                                        </p:tav>
-                                        <p:tav tm="100000">
-                                          <p:val>
-                                            <p:fltVal val="0"/>
-                                          </p:val>
-                                        </p:tav>
-                                      </p:tavLst>
-                                    </p:anim>
-                                    <p:animEffect transition="in" filter="fade">
-                                      <p:cBhvr>
-                                        <p:cTn id="17" dur="1000"/>
-                                        <p:tgtEl>
-                                          <p:spTgt spid="15"/>
-                                        </p:tgtEl>
-                                      </p:cBhvr>
-                                    </p:animEffect>
-                                  </p:childTnLst>
-                                </p:cTn>
-                              </p:par>
-                            </p:childTnLst>
-                          </p:cTn>
-                        </p:par>
-                        <p:par>
-                          <p:cTn id="18" fill="hold">
-                            <p:stCondLst>
-                              <p:cond delay="2000"/>
-                            </p:stCondLst>
-                            <p:childTnLst>
-                              <p:par>
-                                <p:cTn id="19" presetID="31" presetClass="entr" presetSubtype="0" fill="hold" nodeType="afterEffect">
-                                  <p:stCondLst>
-                                    <p:cond delay="0"/>
-                                  </p:stCondLst>
-                                  <p:childTnLst>
-                                    <p:set>
-                                      <p:cBhvr>
-                                        <p:cTn id="20" dur="1" fill="hold">
-                                          <p:stCondLst>
-                                            <p:cond delay="0"/>
-                                          </p:stCondLst>
-                                        </p:cTn>
-                                        <p:tgtEl>
-                                          <p:spTgt spid="17"/>
-                                        </p:tgtEl>
-                                        <p:attrNameLst>
-                                          <p:attrName>style.visibility</p:attrName>
-                                        </p:attrNameLst>
-                                      </p:cBhvr>
-                                      <p:to>
-                                        <p:strVal val="visible"/>
-                                      </p:to>
-                                    </p:set>
-                                    <p:anim calcmode="lin" valueType="num">
-                                      <p:cBhvr>
-                                        <p:cTn id="21" dur="1000" fill="hold"/>
-                                        <p:tgtEl>
-                                          <p:spTgt spid="17"/>
-                                        </p:tgtEl>
-                                        <p:attrNameLst>
-                                          <p:attrName>ppt_w</p:attrName>
-                                        </p:attrNameLst>
-                                      </p:cBhvr>
-                                      <p:tavLst>
-                                        <p:tav tm="0">
-                                          <p:val>
-                                            <p:fltVal val="0"/>
-                                          </p:val>
-                                        </p:tav>
-                                        <p:tav tm="100000">
-                                          <p:val>
-                                            <p:strVal val="#ppt_w"/>
-                                          </p:val>
-                                        </p:tav>
-                                      </p:tavLst>
-                                    </p:anim>
-                                    <p:anim calcmode="lin" valueType="num">
-                                      <p:cBhvr>
-                                        <p:cTn id="22" dur="1000" fill="hold"/>
-                                        <p:tgtEl>
-                                          <p:spTgt spid="17"/>
-                                        </p:tgtEl>
-                                        <p:attrNameLst>
-                                          <p:attrName>ppt_h</p:attrName>
-                                        </p:attrNameLst>
-                                      </p:cBhvr>
-                                      <p:tavLst>
-                                        <p:tav tm="0">
-                                          <p:val>
-                                            <p:fltVal val="0"/>
-                                          </p:val>
-                                        </p:tav>
-                                        <p:tav tm="100000">
-                                          <p:val>
-                                            <p:strVal val="#ppt_h"/>
-                                          </p:val>
-                                        </p:tav>
-                                      </p:tavLst>
-                                    </p:anim>
-                                    <p:anim calcmode="lin" valueType="num">
-                                      <p:cBhvr>
-                                        <p:cTn id="23" dur="1000" fill="hold"/>
-                                        <p:tgtEl>
-                                          <p:spTgt spid="17"/>
-                                        </p:tgtEl>
-                                        <p:attrNameLst>
-                                          <p:attrName>style.rotation</p:attrName>
-                                        </p:attrNameLst>
-                                      </p:cBhvr>
-                                      <p:tavLst>
-                                        <p:tav tm="0">
-                                          <p:val>
-                                            <p:fltVal val="90"/>
-                                          </p:val>
-                                        </p:tav>
-                                        <p:tav tm="100000">
-                                          <p:val>
-                                            <p:fltVal val="0"/>
-                                          </p:val>
-                                        </p:tav>
-                                      </p:tavLst>
-                                    </p:anim>
-                                    <p:animEffect transition="in" filter="fade">
-                                      <p:cBhvr>
-                                        <p:cTn id="24" dur="1000"/>
-                                        <p:tgtEl>
-                                          <p:spTgt spid="17"/>
-                                        </p:tgtEl>
-                                      </p:cBhvr>
-                                    </p:animEffect>
-                                  </p:childTnLst>
-                                </p:cTn>
-                              </p:par>
-                            </p:childTnLst>
-                          </p:cTn>
-                        </p:par>
-                        <p:par>
-                          <p:cTn id="25" fill="hold">
-                            <p:stCondLst>
-                              <p:cond delay="3000"/>
-                            </p:stCondLst>
-                            <p:childTnLst>
-                              <p:par>
-                                <p:cTn id="26" presetID="31" presetClass="entr" presetSubtype="0" fill="hold" nodeType="afterEffect">
-                                  <p:stCondLst>
-                                    <p:cond delay="0"/>
-                                  </p:stCondLst>
-                                  <p:childTnLst>
-                                    <p:set>
-                                      <p:cBhvr>
-                                        <p:cTn id="27" dur="1" fill="hold">
-                                          <p:stCondLst>
-                                            <p:cond delay="0"/>
-                                          </p:stCondLst>
-                                        </p:cTn>
-                                        <p:tgtEl>
-                                          <p:spTgt spid="16"/>
-                                        </p:tgtEl>
-                                        <p:attrNameLst>
-                                          <p:attrName>style.visibility</p:attrName>
-                                        </p:attrNameLst>
-                                      </p:cBhvr>
-                                      <p:to>
-                                        <p:strVal val="visible"/>
-                                      </p:to>
-                                    </p:set>
-                                    <p:anim calcmode="lin" valueType="num">
-                                      <p:cBhvr>
-                                        <p:cTn id="28" dur="1000" fill="hold"/>
-                                        <p:tgtEl>
-                                          <p:spTgt spid="16"/>
-                                        </p:tgtEl>
-                                        <p:attrNameLst>
-                                          <p:attrName>ppt_w</p:attrName>
-                                        </p:attrNameLst>
-                                      </p:cBhvr>
-                                      <p:tavLst>
-                                        <p:tav tm="0">
-                                          <p:val>
-                                            <p:fltVal val="0"/>
-                                          </p:val>
-                                        </p:tav>
-                                        <p:tav tm="100000">
-                                          <p:val>
-                                            <p:strVal val="#ppt_w"/>
-                                          </p:val>
-                                        </p:tav>
-                                      </p:tavLst>
-                                    </p:anim>
-                                    <p:anim calcmode="lin" valueType="num">
-                                      <p:cBhvr>
-                                        <p:cTn id="29" dur="1000" fill="hold"/>
-                                        <p:tgtEl>
-                                          <p:spTgt spid="16"/>
-                                        </p:tgtEl>
-                                        <p:attrNameLst>
-                                          <p:attrName>ppt_h</p:attrName>
-                                        </p:attrNameLst>
-                                      </p:cBhvr>
-                                      <p:tavLst>
-                                        <p:tav tm="0">
-                                          <p:val>
-                                            <p:fltVal val="0"/>
-                                          </p:val>
-                                        </p:tav>
-                                        <p:tav tm="100000">
-                                          <p:val>
-                                            <p:strVal val="#ppt_h"/>
-                                          </p:val>
-                                        </p:tav>
-                                      </p:tavLst>
-                                    </p:anim>
-                                    <p:anim calcmode="lin" valueType="num">
-                                      <p:cBhvr>
-                                        <p:cTn id="30" dur="1000" fill="hold"/>
-                                        <p:tgtEl>
-                                          <p:spTgt spid="16"/>
-                                        </p:tgtEl>
-                                        <p:attrNameLst>
-                                          <p:attrName>style.rotation</p:attrName>
-                                        </p:attrNameLst>
-                                      </p:cBhvr>
-                                      <p:tavLst>
-                                        <p:tav tm="0">
-                                          <p:val>
-                                            <p:fltVal val="90"/>
-                                          </p:val>
-                                        </p:tav>
-                                        <p:tav tm="100000">
-                                          <p:val>
-                                            <p:fltVal val="0"/>
-                                          </p:val>
-                                        </p:tav>
-                                      </p:tavLst>
-                                    </p:anim>
-                                    <p:animEffect transition="in" filter="fade">
-                                      <p:cBhvr>
-                                        <p:cTn id="31" dur="1000"/>
-                                        <p:tgtEl>
-                                          <p:spTgt spid="16"/>
-                                        </p:tgtEl>
-                                      </p:cBhvr>
-                                    </p:animEffect>
-                                  </p:childTnLst>
-                                </p:cTn>
-                              </p:par>
-                            </p:childTnLst>
-                          </p:cTn>
-                        </p:par>
-                        <p:par>
-                          <p:cTn id="32" fill="hold">
-                            <p:stCondLst>
-                              <p:cond delay="4000"/>
-                            </p:stCondLst>
-                            <p:childTnLst>
-                              <p:par>
-                                <p:cTn id="33" presetID="31" presetClass="entr" presetSubtype="0" fill="hold" nodeType="afterEffect">
-                                  <p:stCondLst>
-                                    <p:cond delay="0"/>
-                                  </p:stCondLst>
-                                  <p:childTnLst>
-                                    <p:set>
-                                      <p:cBhvr>
-                                        <p:cTn id="34" dur="1" fill="hold">
-                                          <p:stCondLst>
-                                            <p:cond delay="0"/>
-                                          </p:stCondLst>
-                                        </p:cTn>
-                                        <p:tgtEl>
-                                          <p:spTgt spid="18"/>
-                                        </p:tgtEl>
-                                        <p:attrNameLst>
-                                          <p:attrName>style.visibility</p:attrName>
-                                        </p:attrNameLst>
-                                      </p:cBhvr>
-                                      <p:to>
-                                        <p:strVal val="visible"/>
-                                      </p:to>
-                                    </p:set>
-                                    <p:anim calcmode="lin" valueType="num">
-                                      <p:cBhvr>
-                                        <p:cTn id="35" dur="1000" fill="hold"/>
-                                        <p:tgtEl>
-                                          <p:spTgt spid="18"/>
-                                        </p:tgtEl>
-                                        <p:attrNameLst>
-                                          <p:attrName>ppt_w</p:attrName>
-                                        </p:attrNameLst>
-                                      </p:cBhvr>
-                                      <p:tavLst>
-                                        <p:tav tm="0">
-                                          <p:val>
-                                            <p:fltVal val="0"/>
-                                          </p:val>
-                                        </p:tav>
-                                        <p:tav tm="100000">
-                                          <p:val>
-                                            <p:strVal val="#ppt_w"/>
-                                          </p:val>
-                                        </p:tav>
-                                      </p:tavLst>
-                                    </p:anim>
-                                    <p:anim calcmode="lin" valueType="num">
-                                      <p:cBhvr>
-                                        <p:cTn id="36" dur="1000" fill="hold"/>
-                                        <p:tgtEl>
-                                          <p:spTgt spid="18"/>
-                                        </p:tgtEl>
-                                        <p:attrNameLst>
-                                          <p:attrName>ppt_h</p:attrName>
-                                        </p:attrNameLst>
-                                      </p:cBhvr>
-                                      <p:tavLst>
-                                        <p:tav tm="0">
-                                          <p:val>
-                                            <p:fltVal val="0"/>
-                                          </p:val>
-                                        </p:tav>
-                                        <p:tav tm="100000">
-                                          <p:val>
-                                            <p:strVal val="#ppt_h"/>
-                                          </p:val>
-                                        </p:tav>
-                                      </p:tavLst>
-                                    </p:anim>
-                                    <p:anim calcmode="lin" valueType="num">
-                                      <p:cBhvr>
-                                        <p:cTn id="37" dur="1000" fill="hold"/>
-                                        <p:tgtEl>
-                                          <p:spTgt spid="18"/>
-                                        </p:tgtEl>
-                                        <p:attrNameLst>
-                                          <p:attrName>style.rotation</p:attrName>
-                                        </p:attrNameLst>
-                                      </p:cBhvr>
-                                      <p:tavLst>
-                                        <p:tav tm="0">
-                                          <p:val>
-                                            <p:fltVal val="90"/>
-                                          </p:val>
-                                        </p:tav>
-                                        <p:tav tm="100000">
-                                          <p:val>
-                                            <p:fltVal val="0"/>
-                                          </p:val>
-                                        </p:tav>
-                                      </p:tavLst>
-                                    </p:anim>
-                                    <p:animEffect transition="in" filter="fade">
-                                      <p:cBhvr>
-                                        <p:cTn id="38" dur="1000"/>
-                                        <p:tgtEl>
-                                          <p:spTgt spid="18"/>
-                                        </p:tgtEl>
-                                      </p:cBhvr>
-                                    </p:animEffect>
-                                  </p:childTnLst>
-                                </p:cTn>
-                              </p:par>
-                            </p:childTnLst>
-                          </p:cTn>
-                        </p:par>
-                        <p:par>
-                          <p:cTn id="39" fill="hold">
-                            <p:stCondLst>
-                              <p:cond delay="5000"/>
-                            </p:stCondLst>
-                            <p:childTnLst>
-                              <p:par>
-                                <p:cTn id="40" presetID="31" presetClass="entr" presetSubtype="0" fill="hold" nodeType="afterEffect">
-                                  <p:stCondLst>
-                                    <p:cond delay="0"/>
-                                  </p:stCondLst>
-                                  <p:childTnLst>
-                                    <p:set>
-                                      <p:cBhvr>
-                                        <p:cTn id="41" dur="1" fill="hold">
-                                          <p:stCondLst>
-                                            <p:cond delay="0"/>
-                                          </p:stCondLst>
-                                        </p:cTn>
-                                        <p:tgtEl>
-                                          <p:spTgt spid="19"/>
-                                        </p:tgtEl>
-                                        <p:attrNameLst>
-                                          <p:attrName>style.visibility</p:attrName>
-                                        </p:attrNameLst>
-                                      </p:cBhvr>
-                                      <p:to>
-                                        <p:strVal val="visible"/>
-                                      </p:to>
-                                    </p:set>
-                                    <p:anim calcmode="lin" valueType="num">
-                                      <p:cBhvr>
-                                        <p:cTn id="42" dur="1000" fill="hold"/>
-                                        <p:tgtEl>
-                                          <p:spTgt spid="19"/>
-                                        </p:tgtEl>
-                                        <p:attrNameLst>
-                                          <p:attrName>ppt_w</p:attrName>
-                                        </p:attrNameLst>
-                                      </p:cBhvr>
-                                      <p:tavLst>
-                                        <p:tav tm="0">
-                                          <p:val>
-                                            <p:fltVal val="0"/>
-                                          </p:val>
-                                        </p:tav>
-                                        <p:tav tm="100000">
-                                          <p:val>
-                                            <p:strVal val="#ppt_w"/>
-                                          </p:val>
-                                        </p:tav>
-                                      </p:tavLst>
-                                    </p:anim>
-                                    <p:anim calcmode="lin" valueType="num">
-                                      <p:cBhvr>
-                                        <p:cTn id="43" dur="1000" fill="hold"/>
-                                        <p:tgtEl>
-                                          <p:spTgt spid="19"/>
-                                        </p:tgtEl>
-                                        <p:attrNameLst>
-                                          <p:attrName>ppt_h</p:attrName>
-                                        </p:attrNameLst>
-                                      </p:cBhvr>
-                                      <p:tavLst>
-                                        <p:tav tm="0">
-                                          <p:val>
-                                            <p:fltVal val="0"/>
-                                          </p:val>
-                                        </p:tav>
-                                        <p:tav tm="100000">
-                                          <p:val>
-                                            <p:strVal val="#ppt_h"/>
-                                          </p:val>
-                                        </p:tav>
-                                      </p:tavLst>
-                                    </p:anim>
-                                    <p:anim calcmode="lin" valueType="num">
-                                      <p:cBhvr>
-                                        <p:cTn id="44" dur="1000" fill="hold"/>
-                                        <p:tgtEl>
-                                          <p:spTgt spid="19"/>
-                                        </p:tgtEl>
-                                        <p:attrNameLst>
-                                          <p:attrName>style.rotation</p:attrName>
-                                        </p:attrNameLst>
-                                      </p:cBhvr>
-                                      <p:tavLst>
-                                        <p:tav tm="0">
-                                          <p:val>
-                                            <p:fltVal val="90"/>
-                                          </p:val>
-                                        </p:tav>
-                                        <p:tav tm="100000">
-                                          <p:val>
-                                            <p:fltVal val="0"/>
-                                          </p:val>
-                                        </p:tav>
-                                      </p:tavLst>
-                                    </p:anim>
-                                    <p:animEffect transition="in" filter="fade">
-                                      <p:cBhvr>
-                                        <p:cTn id="45" dur="1000"/>
-                                        <p:tgtEl>
-                                          <p:spTgt spid="19"/>
-                                        </p:tgtEl>
-                                      </p:cBhvr>
-                                    </p:animEffect>
-                                  </p:childTnLst>
-                                </p:cTn>
-                              </p:par>
-                            </p:childTnLst>
-                          </p:cTn>
-                        </p:par>
-                        <p:par>
-                          <p:cTn id="46" fill="hold">
-                            <p:stCondLst>
-                              <p:cond delay="6000"/>
-                            </p:stCondLst>
-                            <p:childTnLst>
-                              <p:par>
-                                <p:cTn id="47" presetID="31" presetClass="entr" presetSubtype="0" fill="hold" nodeType="afterEffect">
-                                  <p:stCondLst>
-                                    <p:cond delay="0"/>
-                                  </p:stCondLst>
-                                  <p:childTnLst>
-                                    <p:set>
-                                      <p:cBhvr>
-                                        <p:cTn id="48" dur="1" fill="hold">
-                                          <p:stCondLst>
-                                            <p:cond delay="0"/>
-                                          </p:stCondLst>
-                                        </p:cTn>
-                                        <p:tgtEl>
-                                          <p:spTgt spid="20"/>
-                                        </p:tgtEl>
-                                        <p:attrNameLst>
-                                          <p:attrName>style.visibility</p:attrName>
-                                        </p:attrNameLst>
-                                      </p:cBhvr>
-                                      <p:to>
-                                        <p:strVal val="visible"/>
-                                      </p:to>
-                                    </p:set>
-                                    <p:anim calcmode="lin" valueType="num">
-                                      <p:cBhvr>
-                                        <p:cTn id="49" dur="1000" fill="hold"/>
-                                        <p:tgtEl>
-                                          <p:spTgt spid="20"/>
-                                        </p:tgtEl>
-                                        <p:attrNameLst>
-                                          <p:attrName>ppt_w</p:attrName>
-                                        </p:attrNameLst>
-                                      </p:cBhvr>
-                                      <p:tavLst>
-                                        <p:tav tm="0">
-                                          <p:val>
-                                            <p:fltVal val="0"/>
-                                          </p:val>
-                                        </p:tav>
-                                        <p:tav tm="100000">
-                                          <p:val>
-                                            <p:strVal val="#ppt_w"/>
-                                          </p:val>
-                                        </p:tav>
-                                      </p:tavLst>
-                                    </p:anim>
-                                    <p:anim calcmode="lin" valueType="num">
-                                      <p:cBhvr>
-                                        <p:cTn id="50" dur="1000" fill="hold"/>
-                                        <p:tgtEl>
-                                          <p:spTgt spid="20"/>
-                                        </p:tgtEl>
-                                        <p:attrNameLst>
-                                          <p:attrName>ppt_h</p:attrName>
-                                        </p:attrNameLst>
-                                      </p:cBhvr>
-                                      <p:tavLst>
-                                        <p:tav tm="0">
-                                          <p:val>
-                                            <p:fltVal val="0"/>
-                                          </p:val>
-                                        </p:tav>
-                                        <p:tav tm="100000">
-                                          <p:val>
-                                            <p:strVal val="#ppt_h"/>
-                                          </p:val>
-                                        </p:tav>
-                                      </p:tavLst>
-                                    </p:anim>
-                                    <p:anim calcmode="lin" valueType="num">
-                                      <p:cBhvr>
-                                        <p:cTn id="51" dur="1000" fill="hold"/>
-                                        <p:tgtEl>
-                                          <p:spTgt spid="20"/>
-                                        </p:tgtEl>
-                                        <p:attrNameLst>
-                                          <p:attrName>style.rotation</p:attrName>
-                                        </p:attrNameLst>
-                                      </p:cBhvr>
-                                      <p:tavLst>
-                                        <p:tav tm="0">
-                                          <p:val>
-                                            <p:fltVal val="90"/>
-                                          </p:val>
-                                        </p:tav>
-                                        <p:tav tm="100000">
-                                          <p:val>
-                                            <p:fltVal val="0"/>
-                                          </p:val>
-                                        </p:tav>
-                                      </p:tavLst>
-                                    </p:anim>
-                                    <p:animEffect transition="in" filter="fade">
-                                      <p:cBhvr>
-                                        <p:cTn id="52" dur="1000"/>
-                                        <p:tgtEl>
-                                          <p:spTgt spid="20"/>
-                                        </p:tgtEl>
-                                      </p:cBhvr>
-                                    </p:animEffect>
-                                  </p:childTnLst>
-                                </p:cTn>
-                              </p:par>
-                            </p:childTnLst>
-                          </p:cTn>
-                        </p:par>
-                      </p:childTnLst>
-                    </p:cTn>
-                  </p:par>
-                </p:childTnLst>
-              </p:cTn>
-              <p:prevCondLst>
-                <p:cond evt="onPrev" delay="0">
-                  <p:tgtEl>
-                    <p:sldTgt/>
-                  </p:tgtEl>
-                </p:cond>
-              </p:prevCondLst>
-              <p:nextCondLst>
-                <p:cond evt="onNext" delay="0">
-                  <p:tgtEl>
-                    <p:sldTgt/>
-                  </p:tgtEl>
-                </p:cond>
-              </p:nextCondLst>
-            </p:seq>
-          </p:childTnLst>
-        </p:cTn>
-      </p:par>
-    </p:tnLst>
-  </p:timing>
-</p:sld>
-</file>
-
-<file path=ppt/slides/slide5.xml><?xml version="1.0" encoding="utf-8"?>
-<p:sld xmlns:a="http://schemas.openxmlformats.org/drawingml/2006/main" xmlns:r="http://schemas.openxmlformats.org/officeDocument/2006/relationships" xmlns:p="http://schemas.openxmlformats.org/presentationml/2006/main" showMasterSp="0">
-  <p:cSld>
-    <p:spTree>
-      <p:nvGrpSpPr>
-        <p:cNvPr id="1" name=""/>
-        <p:cNvGrpSpPr/>
-        <p:nvPr/>
-      </p:nvGrpSpPr>
-      <p:grpSpPr>
-        <a:xfrm>
-          <a:off x="0" y="0"/>
-          <a:ext cx="0" cy="0"/>
-          <a:chOff x="0" y="0"/>
-          <a:chExt cx="0" cy="0"/>
-        </a:xfrm>
-      </p:grpSpPr>
-      <p:pic>
-        <p:nvPicPr>
-          <p:cNvPr id="12" name="Imagen 11"/>
-          <p:cNvPicPr>
-            <a:picLocks noChangeAspect="1"/>
-          </p:cNvPicPr>
-          <p:nvPr/>
-        </p:nvPicPr>
-        <p:blipFill rotWithShape="1">
-          <a:blip r:embed="rId2">
-            <a:extLst>
-              <a:ext uri="{28A0092B-C50C-407E-A947-70E740481C1C}">
-                <a14:useLocalDpi xmlns:a14="http://schemas.microsoft.com/office/drawing/2010/main" val="0"/>
-              </a:ext>
-            </a:extLst>
-          </a:blip>
-          <a:srcRect l="14032" r="10038" b="10863"/>
-          <a:stretch/>
-        </p:blipFill>
-        <p:spPr>
-          <a:xfrm rot="16200000">
-            <a:off x="8471529" y="3004960"/>
-            <a:ext cx="6725431" cy="715511"/>
-          </a:xfrm>
-          <a:prstGeom prst="rect">
-            <a:avLst/>
-          </a:prstGeom>
-        </p:spPr>
-      </p:pic>
-      <p:pic>
-        <p:nvPicPr>
-          <p:cNvPr id="5" name="Imagen 4"/>
-          <p:cNvPicPr>
-            <a:picLocks noChangeAspect="1"/>
-          </p:cNvPicPr>
-          <p:nvPr/>
-        </p:nvPicPr>
-        <p:blipFill>
-          <a:blip r:embed="rId3">
-            <a:extLst>
-              <a:ext uri="{28A0092B-C50C-407E-A947-70E740481C1C}">
-                <a14:useLocalDpi xmlns:a14="http://schemas.microsoft.com/office/drawing/2010/main" val="0"/>
-              </a:ext>
-            </a:extLst>
-          </a:blip>
-          <a:stretch>
-            <a:fillRect/>
-          </a:stretch>
-        </p:blipFill>
-        <p:spPr>
-          <a:xfrm>
-            <a:off x="10320458" y="382391"/>
-            <a:ext cx="1578644" cy="576471"/>
-          </a:xfrm>
-          <a:prstGeom prst="rect">
-            <a:avLst/>
-          </a:prstGeom>
-        </p:spPr>
-      </p:pic>
-      <p:pic>
-        <p:nvPicPr>
-          <p:cNvPr id="6" name="Imagen 5"/>
-          <p:cNvPicPr>
-            <a:picLocks noChangeAspect="1"/>
-          </p:cNvPicPr>
-          <p:nvPr/>
-        </p:nvPicPr>
-        <p:blipFill>
-          <a:blip r:embed="rId4">
-            <a:extLst>
-              <a:ext uri="{28A0092B-C50C-407E-A947-70E740481C1C}">
-                <a14:useLocalDpi xmlns:a14="http://schemas.microsoft.com/office/drawing/2010/main" val="0"/>
-              </a:ext>
-            </a:extLst>
-          </a:blip>
-          <a:stretch>
-            <a:fillRect/>
-          </a:stretch>
-        </p:blipFill>
-        <p:spPr>
-          <a:xfrm>
-            <a:off x="8833174" y="457633"/>
-            <a:ext cx="1288132" cy="504389"/>
-          </a:xfrm>
-          <a:prstGeom prst="rect">
-            <a:avLst/>
-          </a:prstGeom>
-        </p:spPr>
-      </p:pic>
-      <p:pic>
-        <p:nvPicPr>
-          <p:cNvPr id="11" name="Imagen 10"/>
-          <p:cNvPicPr>
-            <a:picLocks noChangeAspect="1"/>
-          </p:cNvPicPr>
-          <p:nvPr/>
-        </p:nvPicPr>
-        <p:blipFill>
-          <a:blip r:embed="rId5">
-            <a:extLst>
-              <a:ext uri="{28A0092B-C50C-407E-A947-70E740481C1C}">
-                <a14:useLocalDpi xmlns:a14="http://schemas.microsoft.com/office/drawing/2010/main" val="0"/>
-              </a:ext>
-            </a:extLst>
-          </a:blip>
-          <a:stretch>
-            <a:fillRect/>
-          </a:stretch>
-        </p:blipFill>
-        <p:spPr>
-          <a:xfrm>
-            <a:off x="165035" y="78488"/>
-            <a:ext cx="8211196" cy="1189873"/>
-          </a:xfrm>
-          <a:prstGeom prst="rect">
-            <a:avLst/>
-          </a:prstGeom>
-        </p:spPr>
-      </p:pic>
-      <p:pic>
-        <p:nvPicPr>
           <p:cNvPr id="3" name="Imagen 2"/>
           <p:cNvPicPr>
             <a:picLocks noChangeAspect="1"/>
@@ -7963,7 +7273,7 @@
         </p:blipFill>
         <p:spPr>
           <a:xfrm>
-            <a:off x="1096467" y="1268361"/>
+            <a:off x="8241630" y="1176561"/>
             <a:ext cx="2581263" cy="2581263"/>
           </a:xfrm>
           <a:prstGeom prst="rect">
@@ -7993,8 +7303,8 @@
         </p:blipFill>
         <p:spPr>
           <a:xfrm>
-            <a:off x="8322495" y="4494612"/>
-            <a:ext cx="1603865" cy="2061635"/>
+            <a:off x="5014030" y="1268361"/>
+            <a:ext cx="1857061" cy="2387097"/>
           </a:xfrm>
           <a:prstGeom prst="rect">
             <a:avLst/>
@@ -8023,8 +7333,8 @@
         </p:blipFill>
         <p:spPr>
           <a:xfrm>
-            <a:off x="4751014" y="1863633"/>
-            <a:ext cx="2783205" cy="2772375"/>
+            <a:off x="883903" y="1268361"/>
+            <a:ext cx="2618249" cy="2608061"/>
           </a:xfrm>
           <a:prstGeom prst="rect">
             <a:avLst/>
@@ -8053,7 +7363,7 @@
         </p:blipFill>
         <p:spPr>
           <a:xfrm>
-            <a:off x="2761488" y="4203538"/>
+            <a:off x="4857721" y="3909775"/>
             <a:ext cx="2431351" cy="2352709"/>
           </a:xfrm>
           <a:prstGeom prst="rect">
@@ -8083,8 +7393,38 @@
         </p:blipFill>
         <p:spPr>
           <a:xfrm>
-            <a:off x="7327102" y="1085481"/>
+            <a:off x="24725" y="3943131"/>
             <a:ext cx="4572000" cy="2286000"/>
+          </a:xfrm>
+          <a:prstGeom prst="rect">
+            <a:avLst/>
+          </a:prstGeom>
+        </p:spPr>
+      </p:pic>
+      <p:pic>
+        <p:nvPicPr>
+          <p:cNvPr id="2" name="Imagen 1"/>
+          <p:cNvPicPr>
+            <a:picLocks noChangeAspect="1"/>
+          </p:cNvPicPr>
+          <p:nvPr/>
+        </p:nvPicPr>
+        <p:blipFill>
+          <a:blip r:embed="rId11">
+            <a:extLst>
+              <a:ext uri="{28A0092B-C50C-407E-A947-70E740481C1C}">
+                <a14:useLocalDpi xmlns:a14="http://schemas.microsoft.com/office/drawing/2010/main" val="0"/>
+              </a:ext>
+            </a:extLst>
+          </a:blip>
+          <a:stretch>
+            <a:fillRect/>
+          </a:stretch>
+        </p:blipFill>
+        <p:spPr>
+          <a:xfrm>
+            <a:off x="8432908" y="4045569"/>
+            <a:ext cx="2088663" cy="2081123"/>
           </a:xfrm>
           <a:prstGeom prst="rect">
             <a:avLst/>
@@ -8200,21 +7540,121 @@
                             </p:childTnLst>
                           </p:cTn>
                         </p:par>
+                      </p:childTnLst>
+                    </p:cTn>
+                  </p:par>
+                  <p:par>
+                    <p:cTn id="9" fill="hold">
+                      <p:stCondLst>
+                        <p:cond delay="indefinite"/>
+                      </p:stCondLst>
+                      <p:childTnLst>
                         <p:par>
-                          <p:cTn id="9" fill="hold">
+                          <p:cTn id="10" fill="hold">
                             <p:stCondLst>
-                              <p:cond delay="500"/>
+                              <p:cond delay="0"/>
                             </p:stCondLst>
                             <p:childTnLst>
                               <p:par>
-                                <p:cTn id="10" presetID="2" presetClass="entr" presetSubtype="4" fill="hold" nodeType="afterEffect">
+                                <p:cTn id="11" presetID="2" presetClass="entr" presetSubtype="4" fill="hold" nodeType="clickEffect">
                                   <p:stCondLst>
                                     <p:cond delay="0"/>
                                   </p:stCondLst>
                                   <p:childTnLst>
                                     <p:set>
                                       <p:cBhvr>
-                                        <p:cTn id="11" dur="1" fill="hold">
+                                        <p:cTn id="12" dur="1" fill="hold">
+                                          <p:stCondLst>
+                                            <p:cond delay="0"/>
+                                          </p:stCondLst>
+                                        </p:cTn>
+                                        <p:tgtEl>
+                                          <p:spTgt spid="4"/>
+                                        </p:tgtEl>
+                                        <p:attrNameLst>
+                                          <p:attrName>style.visibility</p:attrName>
+                                        </p:attrNameLst>
+                                      </p:cBhvr>
+                                      <p:to>
+                                        <p:strVal val="visible"/>
+                                      </p:to>
+                                    </p:set>
+                                    <p:anim calcmode="lin" valueType="num">
+                                      <p:cBhvr additive="base">
+                                        <p:cTn id="13" dur="500" fill="hold"/>
+                                        <p:tgtEl>
+                                          <p:spTgt spid="4"/>
+                                        </p:tgtEl>
+                                        <p:attrNameLst>
+                                          <p:attrName>ppt_x</p:attrName>
+                                        </p:attrNameLst>
+                                      </p:cBhvr>
+                                      <p:tavLst>
+                                        <p:tav tm="0">
+                                          <p:val>
+                                            <p:strVal val="#ppt_x"/>
+                                          </p:val>
+                                        </p:tav>
+                                        <p:tav tm="100000">
+                                          <p:val>
+                                            <p:strVal val="#ppt_x"/>
+                                          </p:val>
+                                        </p:tav>
+                                      </p:tavLst>
+                                    </p:anim>
+                                    <p:anim calcmode="lin" valueType="num">
+                                      <p:cBhvr additive="base">
+                                        <p:cTn id="14" dur="500" fill="hold"/>
+                                        <p:tgtEl>
+                                          <p:spTgt spid="4"/>
+                                        </p:tgtEl>
+                                        <p:attrNameLst>
+                                          <p:attrName>ppt_y</p:attrName>
+                                        </p:attrNameLst>
+                                      </p:cBhvr>
+                                      <p:tavLst>
+                                        <p:tav tm="0">
+                                          <p:val>
+                                            <p:strVal val="1+#ppt_h/2"/>
+                                          </p:val>
+                                        </p:tav>
+                                        <p:tav tm="100000">
+                                          <p:val>
+                                            <p:strVal val="#ppt_y"/>
+                                          </p:val>
+                                        </p:tav>
+                                      </p:tavLst>
+                                    </p:anim>
+                                  </p:childTnLst>
+                                </p:cTn>
+                              </p:par>
+                            </p:childTnLst>
+                          </p:cTn>
+                        </p:par>
+                      </p:childTnLst>
+                    </p:cTn>
+                  </p:par>
+                  <p:par>
+                    <p:cTn id="15" fill="hold">
+                      <p:stCondLst>
+                        <p:cond delay="indefinite"/>
+                      </p:stCondLst>
+                      <p:childTnLst>
+                        <p:par>
+                          <p:cTn id="16" fill="hold">
+                            <p:stCondLst>
+                              <p:cond delay="0"/>
+                            </p:stCondLst>
+                            <p:childTnLst>
+                              <p:par>
+                                <p:cTn id="17" presetID="2" presetClass="entr" presetSubtype="4" fill="hold" nodeType="clickEffect">
+                                  <p:stCondLst>
+                                    <p:cond delay="0"/>
+                                  </p:stCondLst>
+                                  <p:childTnLst>
+                                    <p:set>
+                                      <p:cBhvr>
+                                        <p:cTn id="18" dur="1" fill="hold">
                                           <p:stCondLst>
                                             <p:cond delay="0"/>
                                           </p:stCondLst>
@@ -8232,7 +7672,7 @@
                                     </p:set>
                                     <p:anim calcmode="lin" valueType="num">
                                       <p:cBhvr additive="base">
-                                        <p:cTn id="12" dur="500" fill="hold"/>
+                                        <p:cTn id="19" dur="500" fill="hold"/>
                                         <p:tgtEl>
                                           <p:spTgt spid="3"/>
                                         </p:tgtEl>
@@ -8255,7 +7695,7 @@
                                     </p:anim>
                                     <p:anim calcmode="lin" valueType="num">
                                       <p:cBhvr additive="base">
-                                        <p:cTn id="13" dur="500" fill="hold"/>
+                                        <p:cTn id="20" dur="500" fill="hold"/>
                                         <p:tgtEl>
                                           <p:spTgt spid="3"/>
                                         </p:tgtEl>
@@ -8282,21 +7722,30 @@
                             </p:childTnLst>
                           </p:cTn>
                         </p:par>
+                      </p:childTnLst>
+                    </p:cTn>
+                  </p:par>
+                  <p:par>
+                    <p:cTn id="21" fill="hold">
+                      <p:stCondLst>
+                        <p:cond delay="indefinite"/>
+                      </p:stCondLst>
+                      <p:childTnLst>
                         <p:par>
-                          <p:cTn id="14" fill="hold">
+                          <p:cTn id="22" fill="hold">
                             <p:stCondLst>
-                              <p:cond delay="1000"/>
+                              <p:cond delay="0"/>
                             </p:stCondLst>
                             <p:childTnLst>
                               <p:par>
-                                <p:cTn id="15" presetID="2" presetClass="entr" presetSubtype="4" fill="hold" nodeType="afterEffect">
+                                <p:cTn id="23" presetID="2" presetClass="entr" presetSubtype="4" fill="hold" nodeType="clickEffect">
                                   <p:stCondLst>
                                     <p:cond delay="0"/>
                                   </p:stCondLst>
                                   <p:childTnLst>
                                     <p:set>
                                       <p:cBhvr>
-                                        <p:cTn id="16" dur="1" fill="hold">
+                                        <p:cTn id="24" dur="1" fill="hold">
                                           <p:stCondLst>
                                             <p:cond delay="0"/>
                                           </p:stCondLst>
@@ -8314,7 +7763,7 @@
                                     </p:set>
                                     <p:anim calcmode="lin" valueType="num">
                                       <p:cBhvr additive="base">
-                                        <p:cTn id="17" dur="500" fill="hold"/>
+                                        <p:cTn id="25" dur="500" fill="hold"/>
                                         <p:tgtEl>
                                           <p:spTgt spid="9"/>
                                         </p:tgtEl>
@@ -8337,7 +7786,7 @@
                                     </p:anim>
                                     <p:anim calcmode="lin" valueType="num">
                                       <p:cBhvr additive="base">
-                                        <p:cTn id="18" dur="500" fill="hold"/>
+                                        <p:cTn id="26" dur="500" fill="hold"/>
                                         <p:tgtEl>
                                           <p:spTgt spid="9"/>
                                         </p:tgtEl>
@@ -8364,21 +7813,30 @@
                             </p:childTnLst>
                           </p:cTn>
                         </p:par>
+                      </p:childTnLst>
+                    </p:cTn>
+                  </p:par>
+                  <p:par>
+                    <p:cTn id="27" fill="hold">
+                      <p:stCondLst>
+                        <p:cond delay="indefinite"/>
+                      </p:stCondLst>
+                      <p:childTnLst>
                         <p:par>
-                          <p:cTn id="19" fill="hold">
+                          <p:cTn id="28" fill="hold">
                             <p:stCondLst>
-                              <p:cond delay="1500"/>
+                              <p:cond delay="0"/>
                             </p:stCondLst>
                             <p:childTnLst>
                               <p:par>
-                                <p:cTn id="20" presetID="2" presetClass="entr" presetSubtype="4" fill="hold" nodeType="afterEffect">
+                                <p:cTn id="29" presetID="2" presetClass="entr" presetSubtype="4" fill="hold" nodeType="clickEffect">
                                   <p:stCondLst>
                                     <p:cond delay="0"/>
                                   </p:stCondLst>
                                   <p:childTnLst>
                                     <p:set>
                                       <p:cBhvr>
-                                        <p:cTn id="21" dur="1" fill="hold">
+                                        <p:cTn id="30" dur="1" fill="hold">
                                           <p:stCondLst>
                                             <p:cond delay="0"/>
                                           </p:stCondLst>
@@ -8396,7 +7854,7 @@
                                     </p:set>
                                     <p:anim calcmode="lin" valueType="num">
                                       <p:cBhvr additive="base">
-                                        <p:cTn id="22" dur="500" fill="hold"/>
+                                        <p:cTn id="31" dur="500" fill="hold"/>
                                         <p:tgtEl>
                                           <p:spTgt spid="8"/>
                                         </p:tgtEl>
@@ -8419,7 +7877,7 @@
                                     </p:anim>
                                     <p:anim calcmode="lin" valueType="num">
                                       <p:cBhvr additive="base">
-                                        <p:cTn id="23" dur="500" fill="hold"/>
+                                        <p:cTn id="32" dur="500" fill="hold"/>
                                         <p:tgtEl>
                                           <p:spTgt spid="8"/>
                                         </p:tgtEl>
@@ -8446,27 +7904,36 @@
                             </p:childTnLst>
                           </p:cTn>
                         </p:par>
+                      </p:childTnLst>
+                    </p:cTn>
+                  </p:par>
+                  <p:par>
+                    <p:cTn id="33" fill="hold">
+                      <p:stCondLst>
+                        <p:cond delay="indefinite"/>
+                      </p:stCondLst>
+                      <p:childTnLst>
                         <p:par>
-                          <p:cTn id="24" fill="hold">
+                          <p:cTn id="34" fill="hold">
                             <p:stCondLst>
-                              <p:cond delay="2000"/>
+                              <p:cond delay="0"/>
                             </p:stCondLst>
                             <p:childTnLst>
                               <p:par>
-                                <p:cTn id="25" presetID="2" presetClass="entr" presetSubtype="4" fill="hold" nodeType="afterEffect">
+                                <p:cTn id="35" presetID="2" presetClass="entr" presetSubtype="4" fill="hold" nodeType="clickEffect">
                                   <p:stCondLst>
                                     <p:cond delay="0"/>
                                   </p:stCondLst>
                                   <p:childTnLst>
                                     <p:set>
                                       <p:cBhvr>
-                                        <p:cTn id="26" dur="1" fill="hold">
+                                        <p:cTn id="36" dur="1" fill="hold">
                                           <p:stCondLst>
                                             <p:cond delay="0"/>
                                           </p:stCondLst>
                                         </p:cTn>
                                         <p:tgtEl>
-                                          <p:spTgt spid="4"/>
+                                          <p:spTgt spid="2"/>
                                         </p:tgtEl>
                                         <p:attrNameLst>
                                           <p:attrName>style.visibility</p:attrName>
@@ -8478,9 +7945,9 @@
                                     </p:set>
                                     <p:anim calcmode="lin" valueType="num">
                                       <p:cBhvr additive="base">
-                                        <p:cTn id="27" dur="500" fill="hold"/>
+                                        <p:cTn id="37" dur="500" fill="hold"/>
                                         <p:tgtEl>
-                                          <p:spTgt spid="4"/>
+                                          <p:spTgt spid="2"/>
                                         </p:tgtEl>
                                         <p:attrNameLst>
                                           <p:attrName>ppt_x</p:attrName>
@@ -8501,9 +7968,9 @@
                                     </p:anim>
                                     <p:anim calcmode="lin" valueType="num">
                                       <p:cBhvr additive="base">
-                                        <p:cTn id="28" dur="500" fill="hold"/>
+                                        <p:cTn id="38" dur="500" fill="hold"/>
                                         <p:tgtEl>
-                                          <p:spTgt spid="4"/>
+                                          <p:spTgt spid="2"/>
                                         </p:tgtEl>
                                         <p:attrNameLst>
                                           <p:attrName>ppt_y</p:attrName>
@@ -8556,6 +8023,236 @@
 </p:sld>
 </file>
 
+<file path=ppt/slides/slide5.xml><?xml version="1.0" encoding="utf-8"?>
+<p:sld xmlns:a="http://schemas.openxmlformats.org/drawingml/2006/main" xmlns:r="http://schemas.openxmlformats.org/officeDocument/2006/relationships" xmlns:p="http://schemas.openxmlformats.org/presentationml/2006/main" showMasterSp="0">
+  <p:cSld>
+    <p:spTree>
+      <p:nvGrpSpPr>
+        <p:cNvPr id="1" name=""/>
+        <p:cNvGrpSpPr/>
+        <p:nvPr/>
+      </p:nvGrpSpPr>
+      <p:grpSpPr>
+        <a:xfrm>
+          <a:off x="0" y="0"/>
+          <a:ext cx="0" cy="0"/>
+          <a:chOff x="0" y="0"/>
+          <a:chExt cx="0" cy="0"/>
+        </a:xfrm>
+      </p:grpSpPr>
+      <p:pic>
+        <p:nvPicPr>
+          <p:cNvPr id="12" name="Imagen 11"/>
+          <p:cNvPicPr>
+            <a:picLocks noChangeAspect="1"/>
+          </p:cNvPicPr>
+          <p:nvPr/>
+        </p:nvPicPr>
+        <p:blipFill rotWithShape="1">
+          <a:blip r:embed="rId2">
+            <a:extLst>
+              <a:ext uri="{28A0092B-C50C-407E-A947-70E740481C1C}">
+                <a14:useLocalDpi xmlns:a14="http://schemas.microsoft.com/office/drawing/2010/main" val="0"/>
+              </a:ext>
+            </a:extLst>
+          </a:blip>
+          <a:srcRect l="14032" r="10038" b="10863"/>
+          <a:stretch/>
+        </p:blipFill>
+        <p:spPr>
+          <a:xfrm rot="16200000">
+            <a:off x="8471529" y="3004960"/>
+            <a:ext cx="6725431" cy="715511"/>
+          </a:xfrm>
+          <a:prstGeom prst="rect">
+            <a:avLst/>
+          </a:prstGeom>
+        </p:spPr>
+      </p:pic>
+      <p:pic>
+        <p:nvPicPr>
+          <p:cNvPr id="5" name="Imagen 4"/>
+          <p:cNvPicPr>
+            <a:picLocks noChangeAspect="1"/>
+          </p:cNvPicPr>
+          <p:nvPr/>
+        </p:nvPicPr>
+        <p:blipFill>
+          <a:blip r:embed="rId3">
+            <a:extLst>
+              <a:ext uri="{28A0092B-C50C-407E-A947-70E740481C1C}">
+                <a14:useLocalDpi xmlns:a14="http://schemas.microsoft.com/office/drawing/2010/main" val="0"/>
+              </a:ext>
+            </a:extLst>
+          </a:blip>
+          <a:stretch>
+            <a:fillRect/>
+          </a:stretch>
+        </p:blipFill>
+        <p:spPr>
+          <a:xfrm>
+            <a:off x="10320458" y="382391"/>
+            <a:ext cx="1578644" cy="576471"/>
+          </a:xfrm>
+          <a:prstGeom prst="rect">
+            <a:avLst/>
+          </a:prstGeom>
+        </p:spPr>
+      </p:pic>
+      <p:pic>
+        <p:nvPicPr>
+          <p:cNvPr id="6" name="Imagen 5"/>
+          <p:cNvPicPr>
+            <a:picLocks noChangeAspect="1"/>
+          </p:cNvPicPr>
+          <p:nvPr/>
+        </p:nvPicPr>
+        <p:blipFill>
+          <a:blip r:embed="rId4">
+            <a:extLst>
+              <a:ext uri="{28A0092B-C50C-407E-A947-70E740481C1C}">
+                <a14:useLocalDpi xmlns:a14="http://schemas.microsoft.com/office/drawing/2010/main" val="0"/>
+              </a:ext>
+            </a:extLst>
+          </a:blip>
+          <a:stretch>
+            <a:fillRect/>
+          </a:stretch>
+        </p:blipFill>
+        <p:spPr>
+          <a:xfrm>
+            <a:off x="8833174" y="457633"/>
+            <a:ext cx="1288132" cy="504389"/>
+          </a:xfrm>
+          <a:prstGeom prst="rect">
+            <a:avLst/>
+          </a:prstGeom>
+        </p:spPr>
+      </p:pic>
+      <p:pic>
+        <p:nvPicPr>
+          <p:cNvPr id="11" name="Imagen 10"/>
+          <p:cNvPicPr>
+            <a:picLocks noChangeAspect="1"/>
+          </p:cNvPicPr>
+          <p:nvPr/>
+        </p:nvPicPr>
+        <p:blipFill>
+          <a:blip r:embed="rId5">
+            <a:extLst>
+              <a:ext uri="{28A0092B-C50C-407E-A947-70E740481C1C}">
+                <a14:useLocalDpi xmlns:a14="http://schemas.microsoft.com/office/drawing/2010/main" val="0"/>
+              </a:ext>
+            </a:extLst>
+          </a:blip>
+          <a:stretch>
+            <a:fillRect/>
+          </a:stretch>
+        </p:blipFill>
+        <p:spPr>
+          <a:xfrm>
+            <a:off x="165035" y="78488"/>
+            <a:ext cx="8211196" cy="1189873"/>
+          </a:xfrm>
+          <a:prstGeom prst="rect">
+            <a:avLst/>
+          </a:prstGeom>
+        </p:spPr>
+      </p:pic>
+      <p:pic>
+        <p:nvPicPr>
+          <p:cNvPr id="2" name="Imagen 1"/>
+          <p:cNvPicPr>
+            <a:picLocks noChangeAspect="1"/>
+          </p:cNvPicPr>
+          <p:nvPr/>
+        </p:nvPicPr>
+        <p:blipFill>
+          <a:blip r:embed="rId6">
+            <a:extLst>
+              <a:ext uri="{28A0092B-C50C-407E-A947-70E740481C1C}">
+                <a14:useLocalDpi xmlns:a14="http://schemas.microsoft.com/office/drawing/2010/main" val="0"/>
+              </a:ext>
+            </a:extLst>
+          </a:blip>
+          <a:stretch>
+            <a:fillRect/>
+          </a:stretch>
+        </p:blipFill>
+        <p:spPr>
+          <a:xfrm>
+            <a:off x="3471334" y="2498026"/>
+            <a:ext cx="4169876" cy="3933583"/>
+          </a:xfrm>
+          <a:prstGeom prst="rect">
+            <a:avLst/>
+          </a:prstGeom>
+        </p:spPr>
+      </p:pic>
+      <p:sp>
+        <p:nvSpPr>
+          <p:cNvPr id="4" name="CuadroTexto 3"/>
+          <p:cNvSpPr txBox="1"/>
+          <p:nvPr/>
+        </p:nvSpPr>
+        <p:spPr>
+          <a:xfrm>
+            <a:off x="2752313" y="1360690"/>
+            <a:ext cx="6208764" cy="830997"/>
+          </a:xfrm>
+          <a:prstGeom prst="rect">
+            <a:avLst/>
+          </a:prstGeom>
+          <a:noFill/>
+        </p:spPr>
+        <p:txBody>
+          <a:bodyPr wrap="square" rtlCol="0">
+            <a:spAutoFit/>
+          </a:bodyPr>
+          <a:lstStyle/>
+          <a:p>
+            <a:r>
+              <a:rPr lang="es-ES" sz="4800" dirty="0" smtClean="0">
+                <a:solidFill>
+                  <a:schemeClr val="accent2">
+                    <a:lumMod val="50000"/>
+                  </a:schemeClr>
+                </a:solidFill>
+                <a:latin typeface="Bahnschrift Light" panose="020B0502040204020203" pitchFamily="34" charset="0"/>
+              </a:rPr>
+              <a:t>Etapas del proyecto:</a:t>
+            </a:r>
+            <a:endParaRPr lang="es-ES" sz="4800" dirty="0">
+              <a:solidFill>
+                <a:schemeClr val="accent2">
+                  <a:lumMod val="50000"/>
+                </a:schemeClr>
+              </a:solidFill>
+              <a:latin typeface="Bahnschrift Light" panose="020B0502040204020203" pitchFamily="34" charset="0"/>
+            </a:endParaRPr>
+          </a:p>
+        </p:txBody>
+      </p:sp>
+    </p:spTree>
+    <p:extLst>
+      <p:ext uri="{BB962C8B-B14F-4D97-AF65-F5344CB8AC3E}">
+        <p14:creationId xmlns:p14="http://schemas.microsoft.com/office/powerpoint/2010/main" val="3039983894"/>
+      </p:ext>
+    </p:extLst>
+  </p:cSld>
+  <p:clrMapOvr>
+    <a:masterClrMapping/>
+  </p:clrMapOvr>
+  <p:timing>
+    <p:tnLst>
+      <p:par>
+        <p:cTn id="1" dur="indefinite" restart="never" nodeType="tmRoot"/>
+      </p:par>
+    </p:tnLst>
+  </p:timing>
+</p:sld>
+</file>
+
 <file path=ppt/slides/slide6.xml><?xml version="1.0" encoding="utf-8"?>
 <p:sld xmlns:a="http://schemas.openxmlformats.org/drawingml/2006/main" xmlns:r="http://schemas.openxmlformats.org/officeDocument/2006/relationships" xmlns:p="http://schemas.openxmlformats.org/presentationml/2006/main" showMasterSp="0">
   <p:cSld>
@@ -8692,54 +8389,40 @@
           </a:prstGeom>
         </p:spPr>
       </p:pic>
-      <p:sp>
-        <p:nvSpPr>
-          <p:cNvPr id="2" name="CuadroTexto 1"/>
-          <p:cNvSpPr txBox="1"/>
+      <p:pic>
+        <p:nvPicPr>
+          <p:cNvPr id="3" name="Imagen 2"/>
+          <p:cNvPicPr>
+            <a:picLocks noChangeAspect="1"/>
+          </p:cNvPicPr>
           <p:nvPr/>
-        </p:nvSpPr>
-        <p:spPr>
-          <a:xfrm>
-            <a:off x="1955288" y="2706624"/>
-            <a:ext cx="8166018" cy="769441"/>
+        </p:nvPicPr>
+        <p:blipFill>
+          <a:blip r:embed="rId6">
+            <a:extLst>
+              <a:ext uri="{28A0092B-C50C-407E-A947-70E740481C1C}">
+                <a14:useLocalDpi xmlns:a14="http://schemas.microsoft.com/office/drawing/2010/main" val="0"/>
+              </a:ext>
+            </a:extLst>
+          </a:blip>
+          <a:stretch>
+            <a:fillRect/>
+          </a:stretch>
+        </p:blipFill>
+        <p:spPr>
+          <a:xfrm>
+            <a:off x="558800" y="1371972"/>
+            <a:ext cx="10058400" cy="5353459"/>
           </a:xfrm>
           <a:prstGeom prst="rect">
             <a:avLst/>
           </a:prstGeom>
-          <a:noFill/>
-        </p:spPr>
-        <p:txBody>
-          <a:bodyPr wrap="none" rtlCol="0">
-            <a:spAutoFit/>
-          </a:bodyPr>
-          <a:lstStyle/>
-          <a:p>
-            <a:r>
-              <a:rPr lang="es-ES" sz="4400" dirty="0" smtClean="0">
-                <a:solidFill>
-                  <a:schemeClr val="tx1">
-                    <a:lumMod val="85000"/>
-                    <a:lumOff val="15000"/>
-                  </a:schemeClr>
-                </a:solidFill>
-              </a:rPr>
-              <a:t>¿Qué esperamos de Punta Guía?</a:t>
-            </a:r>
-            <a:endParaRPr lang="es-ES" sz="4400" dirty="0">
-              <a:solidFill>
-                <a:schemeClr val="tx1">
-                  <a:lumMod val="85000"/>
-                  <a:lumOff val="15000"/>
-                </a:schemeClr>
-              </a:solidFill>
-            </a:endParaRPr>
-          </a:p>
-        </p:txBody>
-      </p:sp>
+        </p:spPr>
+      </p:pic>
     </p:spTree>
     <p:extLst>
       <p:ext uri="{BB962C8B-B14F-4D97-AF65-F5344CB8AC3E}">
-        <p14:creationId xmlns:p14="http://schemas.microsoft.com/office/powerpoint/2010/main" val="3756612853"/>
+        <p14:creationId xmlns:p14="http://schemas.microsoft.com/office/powerpoint/2010/main" val="1947104996"/>
       </p:ext>
     </p:extLst>
   </p:cSld>
@@ -8862,6 +8545,50 @@
           </a:prstGeom>
         </p:spPr>
       </p:pic>
+      <p:sp>
+        <p:nvSpPr>
+          <p:cNvPr id="2" name="CuadroTexto 1"/>
+          <p:cNvSpPr txBox="1"/>
+          <p:nvPr/>
+        </p:nvSpPr>
+        <p:spPr>
+          <a:xfrm>
+            <a:off x="4270633" y="2860952"/>
+            <a:ext cx="3942105" cy="830997"/>
+          </a:xfrm>
+          <a:prstGeom prst="rect">
+            <a:avLst/>
+          </a:prstGeom>
+          <a:noFill/>
+        </p:spPr>
+        <p:txBody>
+          <a:bodyPr wrap="none" rtlCol="0">
+            <a:spAutoFit/>
+          </a:bodyPr>
+          <a:lstStyle/>
+          <a:p>
+            <a:r>
+              <a:rPr lang="es-ES" sz="4800" dirty="0" smtClean="0">
+                <a:solidFill>
+                  <a:schemeClr val="tx1">
+                    <a:lumMod val="85000"/>
+                    <a:lumOff val="15000"/>
+                  </a:schemeClr>
+                </a:solidFill>
+              </a:rPr>
+              <a:t>Demostración</a:t>
+            </a:r>
+            <a:endParaRPr lang="es-ES" sz="4800" dirty="0">
+              <a:solidFill>
+                <a:schemeClr val="tx1">
+                  <a:lumMod val="85000"/>
+                  <a:lumOff val="15000"/>
+                </a:schemeClr>
+              </a:solidFill>
+            </a:endParaRPr>
+          </a:p>
+        </p:txBody>
+      </p:sp>
       <p:pic>
         <p:nvPicPr>
           <p:cNvPr id="11" name="Imagen 10"/>
@@ -8892,6 +8619,162 @@
           </a:prstGeom>
         </p:spPr>
       </p:pic>
+    </p:spTree>
+    <p:extLst>
+      <p:ext uri="{BB962C8B-B14F-4D97-AF65-F5344CB8AC3E}">
+        <p14:creationId xmlns:p14="http://schemas.microsoft.com/office/powerpoint/2010/main" val="4004179145"/>
+      </p:ext>
+    </p:extLst>
+  </p:cSld>
+  <p:clrMapOvr>
+    <a:masterClrMapping/>
+  </p:clrMapOvr>
+  <p:timing>
+    <p:tnLst>
+      <p:par>
+        <p:cTn id="1" dur="indefinite" restart="never" nodeType="tmRoot"/>
+      </p:par>
+    </p:tnLst>
+  </p:timing>
+</p:sld>
+</file>
+
+<file path=ppt/slides/slide8.xml><?xml version="1.0" encoding="utf-8"?>
+<p:sld xmlns:a="http://schemas.openxmlformats.org/drawingml/2006/main" xmlns:r="http://schemas.openxmlformats.org/officeDocument/2006/relationships" xmlns:p="http://schemas.openxmlformats.org/presentationml/2006/main" showMasterSp="0">
+  <p:cSld>
+    <p:spTree>
+      <p:nvGrpSpPr>
+        <p:cNvPr id="1" name=""/>
+        <p:cNvGrpSpPr/>
+        <p:nvPr/>
+      </p:nvGrpSpPr>
+      <p:grpSpPr>
+        <a:xfrm>
+          <a:off x="0" y="0"/>
+          <a:ext cx="0" cy="0"/>
+          <a:chOff x="0" y="0"/>
+          <a:chExt cx="0" cy="0"/>
+        </a:xfrm>
+      </p:grpSpPr>
+      <p:pic>
+        <p:nvPicPr>
+          <p:cNvPr id="12" name="Imagen 11"/>
+          <p:cNvPicPr>
+            <a:picLocks noChangeAspect="1"/>
+          </p:cNvPicPr>
+          <p:nvPr/>
+        </p:nvPicPr>
+        <p:blipFill rotWithShape="1">
+          <a:blip r:embed="rId2">
+            <a:extLst>
+              <a:ext uri="{28A0092B-C50C-407E-A947-70E740481C1C}">
+                <a14:useLocalDpi xmlns:a14="http://schemas.microsoft.com/office/drawing/2010/main" val="0"/>
+              </a:ext>
+            </a:extLst>
+          </a:blip>
+          <a:srcRect l="14032" r="10038" b="10863"/>
+          <a:stretch/>
+        </p:blipFill>
+        <p:spPr>
+          <a:xfrm rot="16200000">
+            <a:off x="8471529" y="3004960"/>
+            <a:ext cx="6725431" cy="715511"/>
+          </a:xfrm>
+          <a:prstGeom prst="rect">
+            <a:avLst/>
+          </a:prstGeom>
+        </p:spPr>
+      </p:pic>
+      <p:pic>
+        <p:nvPicPr>
+          <p:cNvPr id="5" name="Imagen 4"/>
+          <p:cNvPicPr>
+            <a:picLocks noChangeAspect="1"/>
+          </p:cNvPicPr>
+          <p:nvPr/>
+        </p:nvPicPr>
+        <p:blipFill>
+          <a:blip r:embed="rId3">
+            <a:extLst>
+              <a:ext uri="{28A0092B-C50C-407E-A947-70E740481C1C}">
+                <a14:useLocalDpi xmlns:a14="http://schemas.microsoft.com/office/drawing/2010/main" val="0"/>
+              </a:ext>
+            </a:extLst>
+          </a:blip>
+          <a:stretch>
+            <a:fillRect/>
+          </a:stretch>
+        </p:blipFill>
+        <p:spPr>
+          <a:xfrm>
+            <a:off x="10320458" y="382391"/>
+            <a:ext cx="1578644" cy="576471"/>
+          </a:xfrm>
+          <a:prstGeom prst="rect">
+            <a:avLst/>
+          </a:prstGeom>
+        </p:spPr>
+      </p:pic>
+      <p:pic>
+        <p:nvPicPr>
+          <p:cNvPr id="6" name="Imagen 5"/>
+          <p:cNvPicPr>
+            <a:picLocks noChangeAspect="1"/>
+          </p:cNvPicPr>
+          <p:nvPr/>
+        </p:nvPicPr>
+        <p:blipFill>
+          <a:blip r:embed="rId4">
+            <a:extLst>
+              <a:ext uri="{28A0092B-C50C-407E-A947-70E740481C1C}">
+                <a14:useLocalDpi xmlns:a14="http://schemas.microsoft.com/office/drawing/2010/main" val="0"/>
+              </a:ext>
+            </a:extLst>
+          </a:blip>
+          <a:stretch>
+            <a:fillRect/>
+          </a:stretch>
+        </p:blipFill>
+        <p:spPr>
+          <a:xfrm>
+            <a:off x="8833174" y="457633"/>
+            <a:ext cx="1288132" cy="504389"/>
+          </a:xfrm>
+          <a:prstGeom prst="rect">
+            <a:avLst/>
+          </a:prstGeom>
+        </p:spPr>
+      </p:pic>
+      <p:pic>
+        <p:nvPicPr>
+          <p:cNvPr id="11" name="Imagen 10"/>
+          <p:cNvPicPr>
+            <a:picLocks noChangeAspect="1"/>
+          </p:cNvPicPr>
+          <p:nvPr/>
+        </p:nvPicPr>
+        <p:blipFill>
+          <a:blip r:embed="rId5">
+            <a:extLst>
+              <a:ext uri="{28A0092B-C50C-407E-A947-70E740481C1C}">
+                <a14:useLocalDpi xmlns:a14="http://schemas.microsoft.com/office/drawing/2010/main" val="0"/>
+              </a:ext>
+            </a:extLst>
+          </a:blip>
+          <a:stretch>
+            <a:fillRect/>
+          </a:stretch>
+        </p:blipFill>
+        <p:spPr>
+          <a:xfrm>
+            <a:off x="165035" y="78488"/>
+            <a:ext cx="8211196" cy="1189873"/>
+          </a:xfrm>
+          <a:prstGeom prst="rect">
+            <a:avLst/>
+          </a:prstGeom>
+        </p:spPr>
+      </p:pic>
       <p:sp>
         <p:nvSpPr>
           <p:cNvPr id="2" name="CuadroTexto 1"/>
@@ -8900,8 +8783,8 @@
         </p:nvSpPr>
         <p:spPr>
           <a:xfrm>
-            <a:off x="3483864" y="2947216"/>
-            <a:ext cx="4733988" cy="830997"/>
+            <a:off x="3281654" y="2977994"/>
+            <a:ext cx="5551520" cy="769441"/>
           </a:xfrm>
           <a:prstGeom prst="rect">
             <a:avLst/>
@@ -8915,6 +8798,176 @@
           <a:lstStyle/>
           <a:p>
             <a:r>
+              <a:rPr lang="es-ES" sz="4400" dirty="0" smtClean="0">
+                <a:solidFill>
+                  <a:schemeClr val="accent2">
+                    <a:lumMod val="50000"/>
+                  </a:schemeClr>
+                </a:solidFill>
+                <a:latin typeface="Bahnschrift Light" panose="020B0502040204020203" pitchFamily="34" charset="0"/>
+              </a:rPr>
+              <a:t>¿Qué resta por hacer?</a:t>
+            </a:r>
+            <a:endParaRPr lang="es-ES" sz="4400" dirty="0">
+              <a:solidFill>
+                <a:schemeClr val="accent2">
+                  <a:lumMod val="50000"/>
+                </a:schemeClr>
+              </a:solidFill>
+              <a:latin typeface="Bahnschrift Light" panose="020B0502040204020203" pitchFamily="34" charset="0"/>
+            </a:endParaRPr>
+          </a:p>
+        </p:txBody>
+      </p:sp>
+    </p:spTree>
+    <p:extLst>
+      <p:ext uri="{BB962C8B-B14F-4D97-AF65-F5344CB8AC3E}">
+        <p14:creationId xmlns:p14="http://schemas.microsoft.com/office/powerpoint/2010/main" val="3756612853"/>
+      </p:ext>
+    </p:extLst>
+  </p:cSld>
+  <p:clrMapOvr>
+    <a:masterClrMapping/>
+  </p:clrMapOvr>
+  <p:timing>
+    <p:tnLst>
+      <p:par>
+        <p:cTn id="1" dur="indefinite" restart="never" nodeType="tmRoot"/>
+      </p:par>
+    </p:tnLst>
+  </p:timing>
+</p:sld>
+</file>
+
+<file path=ppt/slides/slide9.xml><?xml version="1.0" encoding="utf-8"?>
+<p:sld xmlns:a="http://schemas.openxmlformats.org/drawingml/2006/main" xmlns:r="http://schemas.openxmlformats.org/officeDocument/2006/relationships" xmlns:p="http://schemas.openxmlformats.org/presentationml/2006/main" showMasterSp="0">
+  <p:cSld>
+    <p:spTree>
+      <p:nvGrpSpPr>
+        <p:cNvPr id="1" name=""/>
+        <p:cNvGrpSpPr/>
+        <p:nvPr/>
+      </p:nvGrpSpPr>
+      <p:grpSpPr>
+        <a:xfrm>
+          <a:off x="0" y="0"/>
+          <a:ext cx="0" cy="0"/>
+          <a:chOff x="0" y="0"/>
+          <a:chExt cx="0" cy="0"/>
+        </a:xfrm>
+      </p:grpSpPr>
+      <p:pic>
+        <p:nvPicPr>
+          <p:cNvPr id="12" name="Imagen 11"/>
+          <p:cNvPicPr>
+            <a:picLocks noChangeAspect="1"/>
+          </p:cNvPicPr>
+          <p:nvPr/>
+        </p:nvPicPr>
+        <p:blipFill rotWithShape="1">
+          <a:blip r:embed="rId2">
+            <a:extLst>
+              <a:ext uri="{28A0092B-C50C-407E-A947-70E740481C1C}">
+                <a14:useLocalDpi xmlns:a14="http://schemas.microsoft.com/office/drawing/2010/main" val="0"/>
+              </a:ext>
+            </a:extLst>
+          </a:blip>
+          <a:srcRect l="14032" r="10038" b="10863"/>
+          <a:stretch/>
+        </p:blipFill>
+        <p:spPr>
+          <a:xfrm rot="16200000">
+            <a:off x="8471529" y="3004960"/>
+            <a:ext cx="6725431" cy="715511"/>
+          </a:xfrm>
+          <a:prstGeom prst="rect">
+            <a:avLst/>
+          </a:prstGeom>
+        </p:spPr>
+      </p:pic>
+      <p:pic>
+        <p:nvPicPr>
+          <p:cNvPr id="5" name="Imagen 4"/>
+          <p:cNvPicPr>
+            <a:picLocks noChangeAspect="1"/>
+          </p:cNvPicPr>
+          <p:nvPr/>
+        </p:nvPicPr>
+        <p:blipFill>
+          <a:blip r:embed="rId3">
+            <a:extLst>
+              <a:ext uri="{28A0092B-C50C-407E-A947-70E740481C1C}">
+                <a14:useLocalDpi xmlns:a14="http://schemas.microsoft.com/office/drawing/2010/main" val="0"/>
+              </a:ext>
+            </a:extLst>
+          </a:blip>
+          <a:stretch>
+            <a:fillRect/>
+          </a:stretch>
+        </p:blipFill>
+        <p:spPr>
+          <a:xfrm>
+            <a:off x="10320458" y="382391"/>
+            <a:ext cx="1578644" cy="576471"/>
+          </a:xfrm>
+          <a:prstGeom prst="rect">
+            <a:avLst/>
+          </a:prstGeom>
+        </p:spPr>
+      </p:pic>
+      <p:pic>
+        <p:nvPicPr>
+          <p:cNvPr id="6" name="Imagen 5"/>
+          <p:cNvPicPr>
+            <a:picLocks noChangeAspect="1"/>
+          </p:cNvPicPr>
+          <p:nvPr/>
+        </p:nvPicPr>
+        <p:blipFill>
+          <a:blip r:embed="rId4">
+            <a:extLst>
+              <a:ext uri="{28A0092B-C50C-407E-A947-70E740481C1C}">
+                <a14:useLocalDpi xmlns:a14="http://schemas.microsoft.com/office/drawing/2010/main" val="0"/>
+              </a:ext>
+            </a:extLst>
+          </a:blip>
+          <a:stretch>
+            <a:fillRect/>
+          </a:stretch>
+        </p:blipFill>
+        <p:spPr>
+          <a:xfrm>
+            <a:off x="8833174" y="457633"/>
+            <a:ext cx="1288132" cy="504389"/>
+          </a:xfrm>
+          <a:prstGeom prst="rect">
+            <a:avLst/>
+          </a:prstGeom>
+        </p:spPr>
+      </p:pic>
+      <p:sp>
+        <p:nvSpPr>
+          <p:cNvPr id="2" name="CuadroTexto 1"/>
+          <p:cNvSpPr txBox="1"/>
+          <p:nvPr/>
+        </p:nvSpPr>
+        <p:spPr>
+          <a:xfrm>
+            <a:off x="4270633" y="2860952"/>
+            <a:ext cx="3323346" cy="830997"/>
+          </a:xfrm>
+          <a:prstGeom prst="rect">
+            <a:avLst/>
+          </a:prstGeom>
+          <a:noFill/>
+        </p:spPr>
+        <p:txBody>
+          <a:bodyPr wrap="none" rtlCol="0">
+            <a:spAutoFit/>
+          </a:bodyPr>
+          <a:lstStyle/>
+          <a:p>
+            <a:r>
               <a:rPr lang="es-ES" sz="4800" dirty="0" smtClean="0">
                 <a:solidFill>
                   <a:schemeClr val="tx1">
@@ -8923,7 +8976,7 @@
                   </a:schemeClr>
                 </a:solidFill>
               </a:rPr>
-              <a:t>¡Muchas gracias!</a:t>
+              <a:t>¿Preguntas?</a:t>
             </a:r>
             <a:endParaRPr lang="es-ES" sz="4800" dirty="0">
               <a:solidFill>
@@ -8936,10 +8989,40 @@
           </a:p>
         </p:txBody>
       </p:sp>
+      <p:pic>
+        <p:nvPicPr>
+          <p:cNvPr id="11" name="Imagen 10"/>
+          <p:cNvPicPr>
+            <a:picLocks noChangeAspect="1"/>
+          </p:cNvPicPr>
+          <p:nvPr/>
+        </p:nvPicPr>
+        <p:blipFill>
+          <a:blip r:embed="rId5">
+            <a:extLst>
+              <a:ext uri="{28A0092B-C50C-407E-A947-70E740481C1C}">
+                <a14:useLocalDpi xmlns:a14="http://schemas.microsoft.com/office/drawing/2010/main" val="0"/>
+              </a:ext>
+            </a:extLst>
+          </a:blip>
+          <a:stretch>
+            <a:fillRect/>
+          </a:stretch>
+        </p:blipFill>
+        <p:spPr>
+          <a:xfrm>
+            <a:off x="165035" y="78488"/>
+            <a:ext cx="8211196" cy="1189873"/>
+          </a:xfrm>
+          <a:prstGeom prst="rect">
+            <a:avLst/>
+          </a:prstGeom>
+        </p:spPr>
+      </p:pic>
     </p:spTree>
     <p:extLst>
       <p:ext uri="{BB962C8B-B14F-4D97-AF65-F5344CB8AC3E}">
-        <p14:creationId xmlns:p14="http://schemas.microsoft.com/office/powerpoint/2010/main" val="4004179145"/>
+        <p14:creationId xmlns:p14="http://schemas.microsoft.com/office/powerpoint/2010/main" val="1393535594"/>
       </p:ext>
     </p:extLst>
   </p:cSld>

</xml_diff>